<commit_message>
Updated manuscript Second draft completed
</commit_message>
<xml_diff>
--- a/Manuscript/Figures/ROC_Overlapping.pptx
+++ b/Manuscript/Figures/ROC_Overlapping.pptx
@@ -2,12 +2,12 @@
 <file path=ppt/presentation.xml><?xml version="1.0" encoding="utf-8"?>
 <p:presentation xmlns:a="http://schemas.openxmlformats.org/drawingml/2006/main" xmlns:r="http://schemas.openxmlformats.org/officeDocument/2006/relationships" xmlns:p="http://schemas.openxmlformats.org/presentationml/2006/main" saveSubsetFonts="1">
   <p:sldMasterIdLst>
-    <p:sldMasterId id="2147483672" r:id="rId1"/>
+    <p:sldMasterId id="2147483684" r:id="rId1"/>
   </p:sldMasterIdLst>
   <p:sldIdLst>
-    <p:sldId id="256" r:id="rId2"/>
+    <p:sldId id="257" r:id="rId2"/>
   </p:sldIdLst>
-  <p:sldSz cx="5580063" cy="4643438"/>
+  <p:sldSz cx="5148263" cy="2555875"/>
   <p:notesSz cx="6858000" cy="9144000"/>
   <p:defaultTextStyle>
     <a:defPPr>
@@ -115,7 +115,8 @@
 <file path=ppt/revisionInfo.xml><?xml version="1.0" encoding="utf-8"?>
 <p1510:revInfo xmlns:a="http://schemas.openxmlformats.org/drawingml/2006/main" xmlns:r="http://schemas.openxmlformats.org/officeDocument/2006/relationships" xmlns:p1510="http://schemas.microsoft.com/office/powerpoint/2015/10/main">
   <p1510:revLst>
-    <p1510:client id="{9FC24174-03D9-453D-A87C-E3EB2BD1DD64}" v="3" dt="2022-04-19T15:12:23.120"/>
+    <p1510:client id="{15A16D1F-079A-4D0C-B2E0-4DEE8924D81F}" v="9" dt="2022-04-25T11:15:23.856"/>
+    <p1510:client id="{9FC24174-03D9-453D-A87C-E3EB2BD1DD64}" v="2" dt="2022-04-25T11:09:37.042"/>
   </p1510:revLst>
 </p1510:revInfo>
 </file>
@@ -123,9 +124,272 @@
 <file path=ppt/changesInfos/changesInfo1.xml><?xml version="1.0" encoding="utf-8"?>
 <pc:chgInfo xmlns:a="http://schemas.openxmlformats.org/drawingml/2006/main" xmlns:r="http://schemas.openxmlformats.org/officeDocument/2006/relationships" xmlns:ac="http://schemas.microsoft.com/office/drawing/2013/main/command" xmlns:pc="http://schemas.microsoft.com/office/powerpoint/2013/main/command">
   <pc:docChgLst>
+    <pc:chgData name="Fatima Pillosu" userId="a6295d4dc9e22643" providerId="LiveId" clId="{15A16D1F-079A-4D0C-B2E0-4DEE8924D81F}"/>
+    <pc:docChg chg="undo custSel addSld delSld modSld">
+      <pc:chgData name="Fatima Pillosu" userId="a6295d4dc9e22643" providerId="LiveId" clId="{15A16D1F-079A-4D0C-B2E0-4DEE8924D81F}" dt="2022-04-25T11:15:31.433" v="135" actId="1038"/>
+      <pc:docMkLst>
+        <pc:docMk/>
+      </pc:docMkLst>
+      <pc:sldChg chg="del">
+        <pc:chgData name="Fatima Pillosu" userId="a6295d4dc9e22643" providerId="LiveId" clId="{15A16D1F-079A-4D0C-B2E0-4DEE8924D81F}" dt="2022-04-25T11:13:53.508" v="58" actId="2696"/>
+        <pc:sldMkLst>
+          <pc:docMk/>
+          <pc:sldMk cId="4041778352" sldId="256"/>
+        </pc:sldMkLst>
+      </pc:sldChg>
+      <pc:sldChg chg="addSp delSp modSp new mod">
+        <pc:chgData name="Fatima Pillosu" userId="a6295d4dc9e22643" providerId="LiveId" clId="{15A16D1F-079A-4D0C-B2E0-4DEE8924D81F}" dt="2022-04-25T11:15:31.433" v="135" actId="1038"/>
+        <pc:sldMkLst>
+          <pc:docMk/>
+          <pc:sldMk cId="731191140" sldId="257"/>
+        </pc:sldMkLst>
+        <pc:spChg chg="add del mod">
+          <ac:chgData name="Fatima Pillosu" userId="a6295d4dc9e22643" providerId="LiveId" clId="{15A16D1F-079A-4D0C-B2E0-4DEE8924D81F}" dt="2022-04-25T11:15:09.905" v="128" actId="21"/>
+          <ac:spMkLst>
+            <pc:docMk/>
+            <pc:sldMk cId="731191140" sldId="257"/>
+            <ac:spMk id="2" creationId="{67561AEF-B43C-4B9A-8CD7-D8D4D934D642}"/>
+          </ac:spMkLst>
+        </pc:spChg>
+        <pc:spChg chg="del">
+          <ac:chgData name="Fatima Pillosu" userId="a6295d4dc9e22643" providerId="LiveId" clId="{15A16D1F-079A-4D0C-B2E0-4DEE8924D81F}" dt="2022-04-25T11:08:13.806" v="1" actId="478"/>
+          <ac:spMkLst>
+            <pc:docMk/>
+            <pc:sldMk cId="731191140" sldId="257"/>
+            <ac:spMk id="2" creationId="{EFBBCD35-3A05-434F-87B5-C54524643F7A}"/>
+          </ac:spMkLst>
+        </pc:spChg>
+        <pc:spChg chg="del">
+          <ac:chgData name="Fatima Pillosu" userId="a6295d4dc9e22643" providerId="LiveId" clId="{15A16D1F-079A-4D0C-B2E0-4DEE8924D81F}" dt="2022-04-25T11:08:14.869" v="2" actId="478"/>
+          <ac:spMkLst>
+            <pc:docMk/>
+            <pc:sldMk cId="731191140" sldId="257"/>
+            <ac:spMk id="3" creationId="{D2BE8485-36F9-4DF1-ADFF-C563CE84F034}"/>
+          </ac:spMkLst>
+        </pc:spChg>
+        <pc:spChg chg="add del mod">
+          <ac:chgData name="Fatima Pillosu" userId="a6295d4dc9e22643" providerId="LiveId" clId="{15A16D1F-079A-4D0C-B2E0-4DEE8924D81F}" dt="2022-04-25T11:15:09.905" v="128" actId="21"/>
+          <ac:spMkLst>
+            <pc:docMk/>
+            <pc:sldMk cId="731191140" sldId="257"/>
+            <ac:spMk id="4" creationId="{9B36F055-3A97-42FC-9EF1-F5883896DD7F}"/>
+          </ac:spMkLst>
+        </pc:spChg>
+        <pc:spChg chg="add del mod">
+          <ac:chgData name="Fatima Pillosu" userId="a6295d4dc9e22643" providerId="LiveId" clId="{15A16D1F-079A-4D0C-B2E0-4DEE8924D81F}" dt="2022-04-25T11:15:09.905" v="128" actId="21"/>
+          <ac:spMkLst>
+            <pc:docMk/>
+            <pc:sldMk cId="731191140" sldId="257"/>
+            <ac:spMk id="6" creationId="{B7B1668B-219A-44A9-8338-4EE443141D73}"/>
+          </ac:spMkLst>
+        </pc:spChg>
+        <pc:spChg chg="add del mod">
+          <ac:chgData name="Fatima Pillosu" userId="a6295d4dc9e22643" providerId="LiveId" clId="{15A16D1F-079A-4D0C-B2E0-4DEE8924D81F}" dt="2022-04-25T11:15:09.905" v="128" actId="21"/>
+          <ac:spMkLst>
+            <pc:docMk/>
+            <pc:sldMk cId="731191140" sldId="257"/>
+            <ac:spMk id="7" creationId="{13BACBEE-669E-4840-A8E6-F1E37D6BF05E}"/>
+          </ac:spMkLst>
+        </pc:spChg>
+        <pc:spChg chg="add del mod">
+          <ac:chgData name="Fatima Pillosu" userId="a6295d4dc9e22643" providerId="LiveId" clId="{15A16D1F-079A-4D0C-B2E0-4DEE8924D81F}" dt="2022-04-25T11:15:09.905" v="128" actId="21"/>
+          <ac:spMkLst>
+            <pc:docMk/>
+            <pc:sldMk cId="731191140" sldId="257"/>
+            <ac:spMk id="8" creationId="{5924C2C7-5DAE-414E-9C65-581EC1C60585}"/>
+          </ac:spMkLst>
+        </pc:spChg>
+        <pc:spChg chg="add del mod">
+          <ac:chgData name="Fatima Pillosu" userId="a6295d4dc9e22643" providerId="LiveId" clId="{15A16D1F-079A-4D0C-B2E0-4DEE8924D81F}" dt="2022-04-25T11:15:09.905" v="128" actId="21"/>
+          <ac:spMkLst>
+            <pc:docMk/>
+            <pc:sldMk cId="731191140" sldId="257"/>
+            <ac:spMk id="9" creationId="{C463CEEB-7A31-4546-8103-70EFADA672D7}"/>
+          </ac:spMkLst>
+        </pc:spChg>
+        <pc:spChg chg="add del mod">
+          <ac:chgData name="Fatima Pillosu" userId="a6295d4dc9e22643" providerId="LiveId" clId="{15A16D1F-079A-4D0C-B2E0-4DEE8924D81F}" dt="2022-04-25T11:15:09.905" v="128" actId="21"/>
+          <ac:spMkLst>
+            <pc:docMk/>
+            <pc:sldMk cId="731191140" sldId="257"/>
+            <ac:spMk id="10" creationId="{2CD51766-39A6-40A6-926C-C19838BB9F6F}"/>
+          </ac:spMkLst>
+        </pc:spChg>
+        <pc:spChg chg="add del mod">
+          <ac:chgData name="Fatima Pillosu" userId="a6295d4dc9e22643" providerId="LiveId" clId="{15A16D1F-079A-4D0C-B2E0-4DEE8924D81F}" dt="2022-04-25T11:15:09.905" v="128" actId="21"/>
+          <ac:spMkLst>
+            <pc:docMk/>
+            <pc:sldMk cId="731191140" sldId="257"/>
+            <ac:spMk id="12" creationId="{6D71B538-A4C0-446C-9041-191E01F5DAC8}"/>
+          </ac:spMkLst>
+        </pc:spChg>
+        <pc:spChg chg="add del mod">
+          <ac:chgData name="Fatima Pillosu" userId="a6295d4dc9e22643" providerId="LiveId" clId="{15A16D1F-079A-4D0C-B2E0-4DEE8924D81F}" dt="2022-04-25T11:15:09.905" v="128" actId="21"/>
+          <ac:spMkLst>
+            <pc:docMk/>
+            <pc:sldMk cId="731191140" sldId="257"/>
+            <ac:spMk id="14" creationId="{75ECB73D-7E5E-4C01-AB90-229E0220BBE6}"/>
+          </ac:spMkLst>
+        </pc:spChg>
+        <pc:spChg chg="add del mod">
+          <ac:chgData name="Fatima Pillosu" userId="a6295d4dc9e22643" providerId="LiveId" clId="{15A16D1F-079A-4D0C-B2E0-4DEE8924D81F}" dt="2022-04-25T11:15:09.905" v="128" actId="21"/>
+          <ac:spMkLst>
+            <pc:docMk/>
+            <pc:sldMk cId="731191140" sldId="257"/>
+            <ac:spMk id="15" creationId="{3AF81A79-9A90-4EDD-AB82-04DA181359AC}"/>
+          </ac:spMkLst>
+        </pc:spChg>
+        <pc:spChg chg="add mod">
+          <ac:chgData name="Fatima Pillosu" userId="a6295d4dc9e22643" providerId="LiveId" clId="{15A16D1F-079A-4D0C-B2E0-4DEE8924D81F}" dt="2022-04-25T11:15:31.433" v="135" actId="1038"/>
+          <ac:spMkLst>
+            <pc:docMk/>
+            <pc:sldMk cId="731191140" sldId="257"/>
+            <ac:spMk id="18" creationId="{0E6BD9C9-21F8-4A20-A88C-443A9DEDD7FE}"/>
+          </ac:spMkLst>
+        </pc:spChg>
+        <pc:spChg chg="add mod">
+          <ac:chgData name="Fatima Pillosu" userId="a6295d4dc9e22643" providerId="LiveId" clId="{15A16D1F-079A-4D0C-B2E0-4DEE8924D81F}" dt="2022-04-25T11:15:31.433" v="135" actId="1038"/>
+          <ac:spMkLst>
+            <pc:docMk/>
+            <pc:sldMk cId="731191140" sldId="257"/>
+            <ac:spMk id="19" creationId="{AFBA44B8-7770-468F-AC4D-C819ABA89710}"/>
+          </ac:spMkLst>
+        </pc:spChg>
+        <pc:spChg chg="add mod">
+          <ac:chgData name="Fatima Pillosu" userId="a6295d4dc9e22643" providerId="LiveId" clId="{15A16D1F-079A-4D0C-B2E0-4DEE8924D81F}" dt="2022-04-25T11:15:31.433" v="135" actId="1038"/>
+          <ac:spMkLst>
+            <pc:docMk/>
+            <pc:sldMk cId="731191140" sldId="257"/>
+            <ac:spMk id="20" creationId="{E6F596F5-5601-42F8-A496-8E7A754BB188}"/>
+          </ac:spMkLst>
+        </pc:spChg>
+        <pc:spChg chg="add mod">
+          <ac:chgData name="Fatima Pillosu" userId="a6295d4dc9e22643" providerId="LiveId" clId="{15A16D1F-079A-4D0C-B2E0-4DEE8924D81F}" dt="2022-04-25T11:15:31.433" v="135" actId="1038"/>
+          <ac:spMkLst>
+            <pc:docMk/>
+            <pc:sldMk cId="731191140" sldId="257"/>
+            <ac:spMk id="21" creationId="{BB1B2AB8-A98F-44A1-BFD0-A6DEEF3D7F50}"/>
+          </ac:spMkLst>
+        </pc:spChg>
+        <pc:spChg chg="add mod">
+          <ac:chgData name="Fatima Pillosu" userId="a6295d4dc9e22643" providerId="LiveId" clId="{15A16D1F-079A-4D0C-B2E0-4DEE8924D81F}" dt="2022-04-25T11:15:31.433" v="135" actId="1038"/>
+          <ac:spMkLst>
+            <pc:docMk/>
+            <pc:sldMk cId="731191140" sldId="257"/>
+            <ac:spMk id="22" creationId="{6ECB3C22-C4D2-4D7C-BD30-CBB752F08378}"/>
+          </ac:spMkLst>
+        </pc:spChg>
+        <pc:spChg chg="add mod">
+          <ac:chgData name="Fatima Pillosu" userId="a6295d4dc9e22643" providerId="LiveId" clId="{15A16D1F-079A-4D0C-B2E0-4DEE8924D81F}" dt="2022-04-25T11:15:31.433" v="135" actId="1038"/>
+          <ac:spMkLst>
+            <pc:docMk/>
+            <pc:sldMk cId="731191140" sldId="257"/>
+            <ac:spMk id="23" creationId="{B47C0308-D061-4C0D-9E2A-C54B6573C9BF}"/>
+          </ac:spMkLst>
+        </pc:spChg>
+        <pc:spChg chg="add mod">
+          <ac:chgData name="Fatima Pillosu" userId="a6295d4dc9e22643" providerId="LiveId" clId="{15A16D1F-079A-4D0C-B2E0-4DEE8924D81F}" dt="2022-04-25T11:15:31.433" v="135" actId="1038"/>
+          <ac:spMkLst>
+            <pc:docMk/>
+            <pc:sldMk cId="731191140" sldId="257"/>
+            <ac:spMk id="25" creationId="{FCF00110-16E8-4AB1-A591-40E00A1A7C57}"/>
+          </ac:spMkLst>
+        </pc:spChg>
+        <pc:spChg chg="add mod">
+          <ac:chgData name="Fatima Pillosu" userId="a6295d4dc9e22643" providerId="LiveId" clId="{15A16D1F-079A-4D0C-B2E0-4DEE8924D81F}" dt="2022-04-25T11:15:31.433" v="135" actId="1038"/>
+          <ac:spMkLst>
+            <pc:docMk/>
+            <pc:sldMk cId="731191140" sldId="257"/>
+            <ac:spMk id="27" creationId="{E49EF5EB-D355-460C-B7BF-63CDABDDE97B}"/>
+          </ac:spMkLst>
+        </pc:spChg>
+        <pc:spChg chg="add mod">
+          <ac:chgData name="Fatima Pillosu" userId="a6295d4dc9e22643" providerId="LiveId" clId="{15A16D1F-079A-4D0C-B2E0-4DEE8924D81F}" dt="2022-04-25T11:15:31.433" v="135" actId="1038"/>
+          <ac:spMkLst>
+            <pc:docMk/>
+            <pc:sldMk cId="731191140" sldId="257"/>
+            <ac:spMk id="28" creationId="{68727786-CEE6-42D3-ABE6-04D199F99144}"/>
+          </ac:spMkLst>
+        </pc:spChg>
+        <pc:spChg chg="add del mod">
+          <ac:chgData name="Fatima Pillosu" userId="a6295d4dc9e22643" providerId="LiveId" clId="{15A16D1F-079A-4D0C-B2E0-4DEE8924D81F}" dt="2022-04-25T11:15:25.762" v="130" actId="478"/>
+          <ac:spMkLst>
+            <pc:docMk/>
+            <pc:sldMk cId="731191140" sldId="257"/>
+            <ac:spMk id="29" creationId="{4EC6A97F-2BB0-42BF-8377-F07400CA5B2E}"/>
+          </ac:spMkLst>
+        </pc:spChg>
+        <pc:picChg chg="del mod modCrop">
+          <ac:chgData name="Fatima Pillosu" userId="a6295d4dc9e22643" providerId="LiveId" clId="{15A16D1F-079A-4D0C-B2E0-4DEE8924D81F}" dt="2022-04-25T11:15:09.905" v="128" actId="21"/>
+          <ac:picMkLst>
+            <pc:docMk/>
+            <pc:sldMk cId="731191140" sldId="257"/>
+            <ac:picMk id="3" creationId="{F04C25D0-1EFD-43F5-AFE1-78ACEBA87FFB}"/>
+          </ac:picMkLst>
+        </pc:picChg>
+        <pc:picChg chg="del mod modCrop">
+          <ac:chgData name="Fatima Pillosu" userId="a6295d4dc9e22643" providerId="LiveId" clId="{15A16D1F-079A-4D0C-B2E0-4DEE8924D81F}" dt="2022-04-25T11:15:09.905" v="128" actId="21"/>
+          <ac:picMkLst>
+            <pc:docMk/>
+            <pc:sldMk cId="731191140" sldId="257"/>
+            <ac:picMk id="5" creationId="{BF52B1E3-173E-4D71-87B9-0F0EDF6BB3D2}"/>
+          </ac:picMkLst>
+        </pc:picChg>
+        <pc:picChg chg="add mod">
+          <ac:chgData name="Fatima Pillosu" userId="a6295d4dc9e22643" providerId="LiveId" clId="{15A16D1F-079A-4D0C-B2E0-4DEE8924D81F}" dt="2022-04-25T11:15:31.433" v="135" actId="1038"/>
+          <ac:picMkLst>
+            <pc:docMk/>
+            <pc:sldMk cId="731191140" sldId="257"/>
+            <ac:picMk id="16" creationId="{0C43CF89-B007-4BCF-A02C-3ACF15266C35}"/>
+          </ac:picMkLst>
+        </pc:picChg>
+        <pc:picChg chg="add mod">
+          <ac:chgData name="Fatima Pillosu" userId="a6295d4dc9e22643" providerId="LiveId" clId="{15A16D1F-079A-4D0C-B2E0-4DEE8924D81F}" dt="2022-04-25T11:15:31.433" v="135" actId="1038"/>
+          <ac:picMkLst>
+            <pc:docMk/>
+            <pc:sldMk cId="731191140" sldId="257"/>
+            <ac:picMk id="17" creationId="{0CF265B3-1DA6-4317-84FD-BAB4FAFE59B5}"/>
+          </ac:picMkLst>
+        </pc:picChg>
+        <pc:cxnChg chg="add del mod">
+          <ac:chgData name="Fatima Pillosu" userId="a6295d4dc9e22643" providerId="LiveId" clId="{15A16D1F-079A-4D0C-B2E0-4DEE8924D81F}" dt="2022-04-25T11:15:09.905" v="128" actId="21"/>
+          <ac:cxnSpMkLst>
+            <pc:docMk/>
+            <pc:sldMk cId="731191140" sldId="257"/>
+            <ac:cxnSpMk id="11" creationId="{797D11EC-A3AC-44F8-8C58-0FDA20CE1773}"/>
+          </ac:cxnSpMkLst>
+        </pc:cxnChg>
+        <pc:cxnChg chg="add del mod">
+          <ac:chgData name="Fatima Pillosu" userId="a6295d4dc9e22643" providerId="LiveId" clId="{15A16D1F-079A-4D0C-B2E0-4DEE8924D81F}" dt="2022-04-25T11:15:09.905" v="128" actId="21"/>
+          <ac:cxnSpMkLst>
+            <pc:docMk/>
+            <pc:sldMk cId="731191140" sldId="257"/>
+            <ac:cxnSpMk id="13" creationId="{70802F0E-580D-4587-8C2A-746025BB48FE}"/>
+          </ac:cxnSpMkLst>
+        </pc:cxnChg>
+        <pc:cxnChg chg="add mod">
+          <ac:chgData name="Fatima Pillosu" userId="a6295d4dc9e22643" providerId="LiveId" clId="{15A16D1F-079A-4D0C-B2E0-4DEE8924D81F}" dt="2022-04-25T11:15:31.433" v="135" actId="1038"/>
+          <ac:cxnSpMkLst>
+            <pc:docMk/>
+            <pc:sldMk cId="731191140" sldId="257"/>
+            <ac:cxnSpMk id="24" creationId="{CB89CF1D-7E9E-4766-AE20-A47B8EDB91A0}"/>
+          </ac:cxnSpMkLst>
+        </pc:cxnChg>
+        <pc:cxnChg chg="add mod">
+          <ac:chgData name="Fatima Pillosu" userId="a6295d4dc9e22643" providerId="LiveId" clId="{15A16D1F-079A-4D0C-B2E0-4DEE8924D81F}" dt="2022-04-25T11:15:31.433" v="135" actId="1038"/>
+          <ac:cxnSpMkLst>
+            <pc:docMk/>
+            <pc:sldMk cId="731191140" sldId="257"/>
+            <ac:cxnSpMk id="26" creationId="{DFC99975-8DF3-4F98-A91E-E9F5CB389506}"/>
+          </ac:cxnSpMkLst>
+        </pc:cxnChg>
+      </pc:sldChg>
+    </pc:docChg>
+  </pc:docChgLst>
+  <pc:docChgLst>
     <pc:chgData name="Fatima Pillosu" userId="a6295d4dc9e22643" providerId="LiveId" clId="{9FC24174-03D9-453D-A87C-E3EB2BD1DD64}"/>
     <pc:docChg chg="modSld">
-      <pc:chgData name="Fatima Pillosu" userId="a6295d4dc9e22643" providerId="LiveId" clId="{9FC24174-03D9-453D-A87C-E3EB2BD1DD64}" dt="2022-04-19T15:12:43.128" v="19" actId="20577"/>
+      <pc:chgData name="Fatima Pillosu" userId="a6295d4dc9e22643" providerId="LiveId" clId="{9FC24174-03D9-453D-A87C-E3EB2BD1DD64}" dt="2022-04-25T11:09:38.237" v="26" actId="962"/>
       <pc:docMkLst>
         <pc:docMk/>
       </pc:docMkLst>
@@ -184,6 +448,29 @@
           </ac:spMkLst>
         </pc:spChg>
       </pc:sldChg>
+      <pc:sldChg chg="addSp modSp mod">
+        <pc:chgData name="Fatima Pillosu" userId="a6295d4dc9e22643" providerId="LiveId" clId="{9FC24174-03D9-453D-A87C-E3EB2BD1DD64}" dt="2022-04-25T11:09:38.237" v="26" actId="962"/>
+        <pc:sldMkLst>
+          <pc:docMk/>
+          <pc:sldMk cId="731191140" sldId="257"/>
+        </pc:sldMkLst>
+        <pc:picChg chg="add mod">
+          <ac:chgData name="Fatima Pillosu" userId="a6295d4dc9e22643" providerId="LiveId" clId="{9FC24174-03D9-453D-A87C-E3EB2BD1DD64}" dt="2022-04-25T11:09:34.480" v="23" actId="962"/>
+          <ac:picMkLst>
+            <pc:docMk/>
+            <pc:sldMk cId="731191140" sldId="257"/>
+            <ac:picMk id="3" creationId="{F04C25D0-1EFD-43F5-AFE1-78ACEBA87FFB}"/>
+          </ac:picMkLst>
+        </pc:picChg>
+        <pc:picChg chg="add mod">
+          <ac:chgData name="Fatima Pillosu" userId="a6295d4dc9e22643" providerId="LiveId" clId="{9FC24174-03D9-453D-A87C-E3EB2BD1DD64}" dt="2022-04-25T11:09:38.237" v="26" actId="962"/>
+          <ac:picMkLst>
+            <pc:docMk/>
+            <pc:sldMk cId="731191140" sldId="257"/>
+            <ac:picMk id="5" creationId="{BF52B1E3-173E-4D71-87B9-0F0EDF6BB3D2}"/>
+          </ac:picMkLst>
+        </pc:picChg>
+      </pc:sldChg>
     </pc:docChg>
   </pc:docChgLst>
 </pc:chgInfo>
@@ -218,15 +505,15 @@
         </p:nvSpPr>
         <p:spPr>
           <a:xfrm>
-            <a:off x="418505" y="759934"/>
-            <a:ext cx="4743054" cy="1616604"/>
+            <a:off x="643533" y="418288"/>
+            <a:ext cx="3861197" cy="889823"/>
           </a:xfrm>
         </p:spPr>
         <p:txBody>
           <a:bodyPr anchor="b"/>
           <a:lstStyle>
             <a:lvl1pPr algn="ctr">
-              <a:defRPr sz="3661"/>
+              <a:defRPr sz="2236"/>
             </a:lvl1pPr>
           </a:lstStyle>
           <a:p>
@@ -250,8 +537,8 @@
         </p:nvSpPr>
         <p:spPr>
           <a:xfrm>
-            <a:off x="697508" y="2438880"/>
-            <a:ext cx="4185047" cy="1121089"/>
+            <a:off x="643533" y="1342426"/>
+            <a:ext cx="3861197" cy="617078"/>
           </a:xfrm>
         </p:spPr>
         <p:txBody>
@@ -259,39 +546,39 @@
           <a:lstStyle>
             <a:lvl1pPr marL="0" indent="0" algn="ctr">
               <a:buNone/>
-              <a:defRPr sz="1464"/>
+              <a:defRPr sz="894"/>
             </a:lvl1pPr>
-            <a:lvl2pPr marL="278983" indent="0" algn="ctr">
-              <a:buNone/>
-              <a:defRPr sz="1220"/>
+            <a:lvl2pPr marL="170398" indent="0" algn="ctr">
+              <a:buNone/>
+              <a:defRPr sz="745"/>
             </a:lvl2pPr>
-            <a:lvl3pPr marL="557967" indent="0" algn="ctr">
-              <a:buNone/>
-              <a:defRPr sz="1098"/>
+            <a:lvl3pPr marL="340797" indent="0" algn="ctr">
+              <a:buNone/>
+              <a:defRPr sz="671"/>
             </a:lvl3pPr>
-            <a:lvl4pPr marL="836950" indent="0" algn="ctr">
-              <a:buNone/>
-              <a:defRPr sz="976"/>
+            <a:lvl4pPr marL="511195" indent="0" algn="ctr">
+              <a:buNone/>
+              <a:defRPr sz="596"/>
             </a:lvl4pPr>
-            <a:lvl5pPr marL="1115934" indent="0" algn="ctr">
-              <a:buNone/>
-              <a:defRPr sz="976"/>
+            <a:lvl5pPr marL="681594" indent="0" algn="ctr">
+              <a:buNone/>
+              <a:defRPr sz="596"/>
             </a:lvl5pPr>
-            <a:lvl6pPr marL="1394917" indent="0" algn="ctr">
-              <a:buNone/>
-              <a:defRPr sz="976"/>
+            <a:lvl6pPr marL="851992" indent="0" algn="ctr">
+              <a:buNone/>
+              <a:defRPr sz="596"/>
             </a:lvl6pPr>
-            <a:lvl7pPr marL="1673901" indent="0" algn="ctr">
-              <a:buNone/>
-              <a:defRPr sz="976"/>
+            <a:lvl7pPr marL="1022391" indent="0" algn="ctr">
+              <a:buNone/>
+              <a:defRPr sz="596"/>
             </a:lvl7pPr>
-            <a:lvl8pPr marL="1952884" indent="0" algn="ctr">
-              <a:buNone/>
-              <a:defRPr sz="976"/>
+            <a:lvl8pPr marL="1192789" indent="0" algn="ctr">
+              <a:buNone/>
+              <a:defRPr sz="596"/>
             </a:lvl8pPr>
-            <a:lvl9pPr marL="2231868" indent="0" algn="ctr">
-              <a:buNone/>
-              <a:defRPr sz="976"/>
+            <a:lvl9pPr marL="1363188" indent="0" algn="ctr">
+              <a:buNone/>
+              <a:defRPr sz="596"/>
             </a:lvl9pPr>
           </a:lstStyle>
           <a:p>
@@ -320,7 +607,7 @@
           <a:p>
             <a:fld id="{527F55EE-145F-43A8-982A-E7113EE97E9F}" type="datetimeFigureOut">
               <a:rPr lang="en-GB" smtClean="0"/>
-              <a:t>19/04/2022</a:t>
+              <a:t>25/04/2022</a:t>
             </a:fld>
             <a:endParaRPr lang="en-GB"/>
           </a:p>
@@ -371,7 +658,7 @@
     </p:spTree>
     <p:extLst>
       <p:ext uri="{BB962C8B-B14F-4D97-AF65-F5344CB8AC3E}">
-        <p14:creationId xmlns:p14="http://schemas.microsoft.com/office/powerpoint/2010/main" val="2471547704"/>
+        <p14:creationId xmlns:p14="http://schemas.microsoft.com/office/powerpoint/2010/main" val="699360944"/>
       </p:ext>
     </p:extLst>
   </p:cSld>
@@ -490,7 +777,7 @@
           <a:p>
             <a:fld id="{527F55EE-145F-43A8-982A-E7113EE97E9F}" type="datetimeFigureOut">
               <a:rPr lang="en-GB" smtClean="0"/>
-              <a:t>19/04/2022</a:t>
+              <a:t>25/04/2022</a:t>
             </a:fld>
             <a:endParaRPr lang="en-GB"/>
           </a:p>
@@ -541,7 +828,7 @@
     </p:spTree>
     <p:extLst>
       <p:ext uri="{BB962C8B-B14F-4D97-AF65-F5344CB8AC3E}">
-        <p14:creationId xmlns:p14="http://schemas.microsoft.com/office/powerpoint/2010/main" val="550395041"/>
+        <p14:creationId xmlns:p14="http://schemas.microsoft.com/office/powerpoint/2010/main" val="3264674399"/>
       </p:ext>
     </p:extLst>
   </p:cSld>
@@ -580,8 +867,8 @@
         </p:nvSpPr>
         <p:spPr>
           <a:xfrm>
-            <a:off x="3993233" y="247220"/>
-            <a:ext cx="1203201" cy="3935099"/>
+            <a:off x="3684226" y="136077"/>
+            <a:ext cx="1110094" cy="2165986"/>
           </a:xfrm>
         </p:spPr>
         <p:txBody>
@@ -608,8 +895,8 @@
         </p:nvSpPr>
         <p:spPr>
           <a:xfrm>
-            <a:off x="383630" y="247220"/>
-            <a:ext cx="3539852" cy="3935099"/>
+            <a:off x="353943" y="136077"/>
+            <a:ext cx="3265929" cy="2165986"/>
           </a:xfrm>
         </p:spPr>
         <p:txBody>
@@ -670,7 +957,7 @@
           <a:p>
             <a:fld id="{527F55EE-145F-43A8-982A-E7113EE97E9F}" type="datetimeFigureOut">
               <a:rPr lang="en-GB" smtClean="0"/>
-              <a:t>19/04/2022</a:t>
+              <a:t>25/04/2022</a:t>
             </a:fld>
             <a:endParaRPr lang="en-GB"/>
           </a:p>
@@ -721,7 +1008,7 @@
     </p:spTree>
     <p:extLst>
       <p:ext uri="{BB962C8B-B14F-4D97-AF65-F5344CB8AC3E}">
-        <p14:creationId xmlns:p14="http://schemas.microsoft.com/office/powerpoint/2010/main" val="4166379766"/>
+        <p14:creationId xmlns:p14="http://schemas.microsoft.com/office/powerpoint/2010/main" val="976166434"/>
       </p:ext>
     </p:extLst>
   </p:cSld>
@@ -840,7 +1127,7 @@
           <a:p>
             <a:fld id="{527F55EE-145F-43A8-982A-E7113EE97E9F}" type="datetimeFigureOut">
               <a:rPr lang="en-GB" smtClean="0"/>
-              <a:t>19/04/2022</a:t>
+              <a:t>25/04/2022</a:t>
             </a:fld>
             <a:endParaRPr lang="en-GB"/>
           </a:p>
@@ -891,7 +1178,7 @@
     </p:spTree>
     <p:extLst>
       <p:ext uri="{BB962C8B-B14F-4D97-AF65-F5344CB8AC3E}">
-        <p14:creationId xmlns:p14="http://schemas.microsoft.com/office/powerpoint/2010/main" val="3236598689"/>
+        <p14:creationId xmlns:p14="http://schemas.microsoft.com/office/powerpoint/2010/main" val="86530760"/>
       </p:ext>
     </p:extLst>
   </p:cSld>
@@ -930,15 +1217,15 @@
         </p:nvSpPr>
         <p:spPr>
           <a:xfrm>
-            <a:off x="380724" y="1157636"/>
-            <a:ext cx="4812804" cy="1931541"/>
+            <a:off x="351262" y="637194"/>
+            <a:ext cx="4440377" cy="1063173"/>
           </a:xfrm>
         </p:spPr>
         <p:txBody>
           <a:bodyPr anchor="b"/>
           <a:lstStyle>
             <a:lvl1pPr>
-              <a:defRPr sz="3661"/>
+              <a:defRPr sz="2236"/>
             </a:lvl1pPr>
           </a:lstStyle>
           <a:p>
@@ -962,8 +1249,8 @@
         </p:nvSpPr>
         <p:spPr>
           <a:xfrm>
-            <a:off x="380724" y="3107450"/>
-            <a:ext cx="4812804" cy="1015752"/>
+            <a:off x="351262" y="1710425"/>
+            <a:ext cx="4440377" cy="559097"/>
           </a:xfrm>
         </p:spPr>
         <p:txBody>
@@ -971,15 +1258,17 @@
           <a:lstStyle>
             <a:lvl1pPr marL="0" indent="0">
               <a:buNone/>
-              <a:defRPr sz="1464">
+              <a:defRPr sz="894">
                 <a:solidFill>
-                  <a:schemeClr val="tx1"/>
+                  <a:schemeClr val="tx1">
+                    <a:tint val="75000"/>
+                  </a:schemeClr>
                 </a:solidFill>
               </a:defRPr>
             </a:lvl1pPr>
-            <a:lvl2pPr marL="278983" indent="0">
-              <a:buNone/>
-              <a:defRPr sz="1220">
+            <a:lvl2pPr marL="170398" indent="0">
+              <a:buNone/>
+              <a:defRPr sz="745">
                 <a:solidFill>
                   <a:schemeClr val="tx1">
                     <a:tint val="75000"/>
@@ -987,9 +1276,9 @@
                 </a:solidFill>
               </a:defRPr>
             </a:lvl2pPr>
-            <a:lvl3pPr marL="557967" indent="0">
-              <a:buNone/>
-              <a:defRPr sz="1098">
+            <a:lvl3pPr marL="340797" indent="0">
+              <a:buNone/>
+              <a:defRPr sz="671">
                 <a:solidFill>
                   <a:schemeClr val="tx1">
                     <a:tint val="75000"/>
@@ -997,9 +1286,9 @@
                 </a:solidFill>
               </a:defRPr>
             </a:lvl3pPr>
-            <a:lvl4pPr marL="836950" indent="0">
-              <a:buNone/>
-              <a:defRPr sz="976">
+            <a:lvl4pPr marL="511195" indent="0">
+              <a:buNone/>
+              <a:defRPr sz="596">
                 <a:solidFill>
                   <a:schemeClr val="tx1">
                     <a:tint val="75000"/>
@@ -1007,9 +1296,9 @@
                 </a:solidFill>
               </a:defRPr>
             </a:lvl4pPr>
-            <a:lvl5pPr marL="1115934" indent="0">
-              <a:buNone/>
-              <a:defRPr sz="976">
+            <a:lvl5pPr marL="681594" indent="0">
+              <a:buNone/>
+              <a:defRPr sz="596">
                 <a:solidFill>
                   <a:schemeClr val="tx1">
                     <a:tint val="75000"/>
@@ -1017,9 +1306,9 @@
                 </a:solidFill>
               </a:defRPr>
             </a:lvl5pPr>
-            <a:lvl6pPr marL="1394917" indent="0">
-              <a:buNone/>
-              <a:defRPr sz="976">
+            <a:lvl6pPr marL="851992" indent="0">
+              <a:buNone/>
+              <a:defRPr sz="596">
                 <a:solidFill>
                   <a:schemeClr val="tx1">
                     <a:tint val="75000"/>
@@ -1027,9 +1316,9 @@
                 </a:solidFill>
               </a:defRPr>
             </a:lvl6pPr>
-            <a:lvl7pPr marL="1673901" indent="0">
-              <a:buNone/>
-              <a:defRPr sz="976">
+            <a:lvl7pPr marL="1022391" indent="0">
+              <a:buNone/>
+              <a:defRPr sz="596">
                 <a:solidFill>
                   <a:schemeClr val="tx1">
                     <a:tint val="75000"/>
@@ -1037,9 +1326,9 @@
                 </a:solidFill>
               </a:defRPr>
             </a:lvl7pPr>
-            <a:lvl8pPr marL="1952884" indent="0">
-              <a:buNone/>
-              <a:defRPr sz="976">
+            <a:lvl8pPr marL="1192789" indent="0">
+              <a:buNone/>
+              <a:defRPr sz="596">
                 <a:solidFill>
                   <a:schemeClr val="tx1">
                     <a:tint val="75000"/>
@@ -1047,9 +1336,9 @@
                 </a:solidFill>
               </a:defRPr>
             </a:lvl8pPr>
-            <a:lvl9pPr marL="2231868" indent="0">
-              <a:buNone/>
-              <a:defRPr sz="976">
+            <a:lvl9pPr marL="1363188" indent="0">
+              <a:buNone/>
+              <a:defRPr sz="596">
                 <a:solidFill>
                   <a:schemeClr val="tx1">
                     <a:tint val="75000"/>
@@ -1084,7 +1373,7 @@
           <a:p>
             <a:fld id="{527F55EE-145F-43A8-982A-E7113EE97E9F}" type="datetimeFigureOut">
               <a:rPr lang="en-GB" smtClean="0"/>
-              <a:t>19/04/2022</a:t>
+              <a:t>25/04/2022</a:t>
             </a:fld>
             <a:endParaRPr lang="en-GB"/>
           </a:p>
@@ -1135,7 +1424,7 @@
     </p:spTree>
     <p:extLst>
       <p:ext uri="{BB962C8B-B14F-4D97-AF65-F5344CB8AC3E}">
-        <p14:creationId xmlns:p14="http://schemas.microsoft.com/office/powerpoint/2010/main" val="2222948373"/>
+        <p14:creationId xmlns:p14="http://schemas.microsoft.com/office/powerpoint/2010/main" val="3203920115"/>
       </p:ext>
     </p:extLst>
   </p:cSld>
@@ -1197,8 +1486,8 @@
         </p:nvSpPr>
         <p:spPr>
           <a:xfrm>
-            <a:off x="383629" y="1236100"/>
-            <a:ext cx="2371527" cy="2946219"/>
+            <a:off x="353943" y="680383"/>
+            <a:ext cx="2188012" cy="1621679"/>
           </a:xfrm>
         </p:spPr>
         <p:txBody>
@@ -1254,8 +1543,8 @@
         </p:nvSpPr>
         <p:spPr>
           <a:xfrm>
-            <a:off x="2824907" y="1236100"/>
-            <a:ext cx="2371527" cy="2946219"/>
+            <a:off x="2606308" y="680383"/>
+            <a:ext cx="2188012" cy="1621679"/>
           </a:xfrm>
         </p:spPr>
         <p:txBody>
@@ -1316,7 +1605,7 @@
           <a:p>
             <a:fld id="{527F55EE-145F-43A8-982A-E7113EE97E9F}" type="datetimeFigureOut">
               <a:rPr lang="en-GB" smtClean="0"/>
-              <a:t>19/04/2022</a:t>
+              <a:t>25/04/2022</a:t>
             </a:fld>
             <a:endParaRPr lang="en-GB"/>
           </a:p>
@@ -1367,7 +1656,7 @@
     </p:spTree>
     <p:extLst>
       <p:ext uri="{BB962C8B-B14F-4D97-AF65-F5344CB8AC3E}">
-        <p14:creationId xmlns:p14="http://schemas.microsoft.com/office/powerpoint/2010/main" val="3298279399"/>
+        <p14:creationId xmlns:p14="http://schemas.microsoft.com/office/powerpoint/2010/main" val="3031202260"/>
       </p:ext>
     </p:extLst>
   </p:cSld>
@@ -1406,8 +1695,8 @@
         </p:nvSpPr>
         <p:spPr>
           <a:xfrm>
-            <a:off x="384356" y="247221"/>
-            <a:ext cx="4812804" cy="897517"/>
+            <a:off x="354614" y="136077"/>
+            <a:ext cx="4440377" cy="494018"/>
           </a:xfrm>
         </p:spPr>
         <p:txBody>
@@ -1434,8 +1723,8 @@
         </p:nvSpPr>
         <p:spPr>
           <a:xfrm>
-            <a:off x="384357" y="1138288"/>
-            <a:ext cx="2360628" cy="557857"/>
+            <a:off x="354614" y="626544"/>
+            <a:ext cx="2177956" cy="307060"/>
           </a:xfrm>
         </p:spPr>
         <p:txBody>
@@ -1443,39 +1732,39 @@
           <a:lstStyle>
             <a:lvl1pPr marL="0" indent="0">
               <a:buNone/>
-              <a:defRPr sz="1464" b="1"/>
+              <a:defRPr sz="894" b="1"/>
             </a:lvl1pPr>
-            <a:lvl2pPr marL="278983" indent="0">
-              <a:buNone/>
-              <a:defRPr sz="1220" b="1"/>
+            <a:lvl2pPr marL="170398" indent="0">
+              <a:buNone/>
+              <a:defRPr sz="745" b="1"/>
             </a:lvl2pPr>
-            <a:lvl3pPr marL="557967" indent="0">
-              <a:buNone/>
-              <a:defRPr sz="1098" b="1"/>
+            <a:lvl3pPr marL="340797" indent="0">
+              <a:buNone/>
+              <a:defRPr sz="671" b="1"/>
             </a:lvl3pPr>
-            <a:lvl4pPr marL="836950" indent="0">
-              <a:buNone/>
-              <a:defRPr sz="976" b="1"/>
+            <a:lvl4pPr marL="511195" indent="0">
+              <a:buNone/>
+              <a:defRPr sz="596" b="1"/>
             </a:lvl4pPr>
-            <a:lvl5pPr marL="1115934" indent="0">
-              <a:buNone/>
-              <a:defRPr sz="976" b="1"/>
+            <a:lvl5pPr marL="681594" indent="0">
+              <a:buNone/>
+              <a:defRPr sz="596" b="1"/>
             </a:lvl5pPr>
-            <a:lvl6pPr marL="1394917" indent="0">
-              <a:buNone/>
-              <a:defRPr sz="976" b="1"/>
+            <a:lvl6pPr marL="851992" indent="0">
+              <a:buNone/>
+              <a:defRPr sz="596" b="1"/>
             </a:lvl6pPr>
-            <a:lvl7pPr marL="1673901" indent="0">
-              <a:buNone/>
-              <a:defRPr sz="976" b="1"/>
+            <a:lvl7pPr marL="1022391" indent="0">
+              <a:buNone/>
+              <a:defRPr sz="596" b="1"/>
             </a:lvl7pPr>
-            <a:lvl8pPr marL="1952884" indent="0">
-              <a:buNone/>
-              <a:defRPr sz="976" b="1"/>
+            <a:lvl8pPr marL="1192789" indent="0">
+              <a:buNone/>
+              <a:defRPr sz="596" b="1"/>
             </a:lvl8pPr>
-            <a:lvl9pPr marL="2231868" indent="0">
-              <a:buNone/>
-              <a:defRPr sz="976" b="1"/>
+            <a:lvl9pPr marL="1363188" indent="0">
+              <a:buNone/>
+              <a:defRPr sz="596" b="1"/>
             </a:lvl9pPr>
           </a:lstStyle>
           <a:p>
@@ -1499,8 +1788,8 @@
         </p:nvSpPr>
         <p:spPr>
           <a:xfrm>
-            <a:off x="384357" y="1696145"/>
-            <a:ext cx="2360628" cy="2494773"/>
+            <a:off x="354614" y="933605"/>
+            <a:ext cx="2177956" cy="1373191"/>
           </a:xfrm>
         </p:spPr>
         <p:txBody>
@@ -1556,8 +1845,8 @@
         </p:nvSpPr>
         <p:spPr>
           <a:xfrm>
-            <a:off x="2824907" y="1138288"/>
-            <a:ext cx="2372254" cy="557857"/>
+            <a:off x="2606308" y="626544"/>
+            <a:ext cx="2188682" cy="307060"/>
           </a:xfrm>
         </p:spPr>
         <p:txBody>
@@ -1565,39 +1854,39 @@
           <a:lstStyle>
             <a:lvl1pPr marL="0" indent="0">
               <a:buNone/>
-              <a:defRPr sz="1464" b="1"/>
+              <a:defRPr sz="894" b="1"/>
             </a:lvl1pPr>
-            <a:lvl2pPr marL="278983" indent="0">
-              <a:buNone/>
-              <a:defRPr sz="1220" b="1"/>
+            <a:lvl2pPr marL="170398" indent="0">
+              <a:buNone/>
+              <a:defRPr sz="745" b="1"/>
             </a:lvl2pPr>
-            <a:lvl3pPr marL="557967" indent="0">
-              <a:buNone/>
-              <a:defRPr sz="1098" b="1"/>
+            <a:lvl3pPr marL="340797" indent="0">
+              <a:buNone/>
+              <a:defRPr sz="671" b="1"/>
             </a:lvl3pPr>
-            <a:lvl4pPr marL="836950" indent="0">
-              <a:buNone/>
-              <a:defRPr sz="976" b="1"/>
+            <a:lvl4pPr marL="511195" indent="0">
+              <a:buNone/>
+              <a:defRPr sz="596" b="1"/>
             </a:lvl4pPr>
-            <a:lvl5pPr marL="1115934" indent="0">
-              <a:buNone/>
-              <a:defRPr sz="976" b="1"/>
+            <a:lvl5pPr marL="681594" indent="0">
+              <a:buNone/>
+              <a:defRPr sz="596" b="1"/>
             </a:lvl5pPr>
-            <a:lvl6pPr marL="1394917" indent="0">
-              <a:buNone/>
-              <a:defRPr sz="976" b="1"/>
+            <a:lvl6pPr marL="851992" indent="0">
+              <a:buNone/>
+              <a:defRPr sz="596" b="1"/>
             </a:lvl6pPr>
-            <a:lvl7pPr marL="1673901" indent="0">
-              <a:buNone/>
-              <a:defRPr sz="976" b="1"/>
+            <a:lvl7pPr marL="1022391" indent="0">
+              <a:buNone/>
+              <a:defRPr sz="596" b="1"/>
             </a:lvl7pPr>
-            <a:lvl8pPr marL="1952884" indent="0">
-              <a:buNone/>
-              <a:defRPr sz="976" b="1"/>
+            <a:lvl8pPr marL="1192789" indent="0">
+              <a:buNone/>
+              <a:defRPr sz="596" b="1"/>
             </a:lvl8pPr>
-            <a:lvl9pPr marL="2231868" indent="0">
-              <a:buNone/>
-              <a:defRPr sz="976" b="1"/>
+            <a:lvl9pPr marL="1363188" indent="0">
+              <a:buNone/>
+              <a:defRPr sz="596" b="1"/>
             </a:lvl9pPr>
           </a:lstStyle>
           <a:p>
@@ -1621,8 +1910,8 @@
         </p:nvSpPr>
         <p:spPr>
           <a:xfrm>
-            <a:off x="2824907" y="1696145"/>
-            <a:ext cx="2372254" cy="2494773"/>
+            <a:off x="2606308" y="933605"/>
+            <a:ext cx="2188682" cy="1373191"/>
           </a:xfrm>
         </p:spPr>
         <p:txBody>
@@ -1683,7 +1972,7 @@
           <a:p>
             <a:fld id="{527F55EE-145F-43A8-982A-E7113EE97E9F}" type="datetimeFigureOut">
               <a:rPr lang="en-GB" smtClean="0"/>
-              <a:t>19/04/2022</a:t>
+              <a:t>25/04/2022</a:t>
             </a:fld>
             <a:endParaRPr lang="en-GB"/>
           </a:p>
@@ -1734,7 +2023,7 @@
     </p:spTree>
     <p:extLst>
       <p:ext uri="{BB962C8B-B14F-4D97-AF65-F5344CB8AC3E}">
-        <p14:creationId xmlns:p14="http://schemas.microsoft.com/office/powerpoint/2010/main" val="1646010043"/>
+        <p14:creationId xmlns:p14="http://schemas.microsoft.com/office/powerpoint/2010/main" val="158017295"/>
       </p:ext>
     </p:extLst>
   </p:cSld>
@@ -1801,7 +2090,7 @@
           <a:p>
             <a:fld id="{527F55EE-145F-43A8-982A-E7113EE97E9F}" type="datetimeFigureOut">
               <a:rPr lang="en-GB" smtClean="0"/>
-              <a:t>19/04/2022</a:t>
+              <a:t>25/04/2022</a:t>
             </a:fld>
             <a:endParaRPr lang="en-GB"/>
           </a:p>
@@ -1852,7 +2141,7 @@
     </p:spTree>
     <p:extLst>
       <p:ext uri="{BB962C8B-B14F-4D97-AF65-F5344CB8AC3E}">
-        <p14:creationId xmlns:p14="http://schemas.microsoft.com/office/powerpoint/2010/main" val="245254600"/>
+        <p14:creationId xmlns:p14="http://schemas.microsoft.com/office/powerpoint/2010/main" val="3979289856"/>
       </p:ext>
     </p:extLst>
   </p:cSld>
@@ -1896,7 +2185,7 @@
           <a:p>
             <a:fld id="{527F55EE-145F-43A8-982A-E7113EE97E9F}" type="datetimeFigureOut">
               <a:rPr lang="en-GB" smtClean="0"/>
-              <a:t>19/04/2022</a:t>
+              <a:t>25/04/2022</a:t>
             </a:fld>
             <a:endParaRPr lang="en-GB"/>
           </a:p>
@@ -1947,7 +2236,7 @@
     </p:spTree>
     <p:extLst>
       <p:ext uri="{BB962C8B-B14F-4D97-AF65-F5344CB8AC3E}">
-        <p14:creationId xmlns:p14="http://schemas.microsoft.com/office/powerpoint/2010/main" val="4248763157"/>
+        <p14:creationId xmlns:p14="http://schemas.microsoft.com/office/powerpoint/2010/main" val="3327766540"/>
       </p:ext>
     </p:extLst>
   </p:cSld>
@@ -1986,15 +2275,15 @@
         </p:nvSpPr>
         <p:spPr>
           <a:xfrm>
-            <a:off x="384356" y="309562"/>
-            <a:ext cx="1799716" cy="1083469"/>
+            <a:off x="354614" y="170392"/>
+            <a:ext cx="1660449" cy="596371"/>
           </a:xfrm>
         </p:spPr>
         <p:txBody>
           <a:bodyPr anchor="b"/>
           <a:lstStyle>
             <a:lvl1pPr>
-              <a:defRPr sz="1953"/>
+              <a:defRPr sz="1193"/>
             </a:lvl1pPr>
           </a:lstStyle>
           <a:p>
@@ -2018,39 +2307,39 @@
         </p:nvSpPr>
         <p:spPr>
           <a:xfrm>
-            <a:off x="2372254" y="668570"/>
-            <a:ext cx="2824907" cy="3299851"/>
+            <a:off x="2188682" y="367999"/>
+            <a:ext cx="2606308" cy="1816328"/>
           </a:xfrm>
         </p:spPr>
         <p:txBody>
           <a:bodyPr/>
           <a:lstStyle>
             <a:lvl1pPr>
-              <a:defRPr sz="1953"/>
+              <a:defRPr sz="1193"/>
             </a:lvl1pPr>
             <a:lvl2pPr>
-              <a:defRPr sz="1709"/>
+              <a:defRPr sz="1044"/>
             </a:lvl2pPr>
             <a:lvl3pPr>
-              <a:defRPr sz="1464"/>
+              <a:defRPr sz="894"/>
             </a:lvl3pPr>
             <a:lvl4pPr>
-              <a:defRPr sz="1220"/>
+              <a:defRPr sz="745"/>
             </a:lvl4pPr>
             <a:lvl5pPr>
-              <a:defRPr sz="1220"/>
+              <a:defRPr sz="745"/>
             </a:lvl5pPr>
             <a:lvl6pPr>
-              <a:defRPr sz="1220"/>
+              <a:defRPr sz="745"/>
             </a:lvl6pPr>
             <a:lvl7pPr>
-              <a:defRPr sz="1220"/>
+              <a:defRPr sz="745"/>
             </a:lvl7pPr>
             <a:lvl8pPr>
-              <a:defRPr sz="1220"/>
+              <a:defRPr sz="745"/>
             </a:lvl8pPr>
             <a:lvl9pPr>
-              <a:defRPr sz="1220"/>
+              <a:defRPr sz="745"/>
             </a:lvl9pPr>
           </a:lstStyle>
           <a:p>
@@ -2103,8 +2392,8 @@
         </p:nvSpPr>
         <p:spPr>
           <a:xfrm>
-            <a:off x="384356" y="1393031"/>
-            <a:ext cx="1799716" cy="2580763"/>
+            <a:off x="354614" y="766763"/>
+            <a:ext cx="1660449" cy="1420522"/>
           </a:xfrm>
         </p:spPr>
         <p:txBody>
@@ -2112,39 +2401,39 @@
           <a:lstStyle>
             <a:lvl1pPr marL="0" indent="0">
               <a:buNone/>
-              <a:defRPr sz="976"/>
+              <a:defRPr sz="596"/>
             </a:lvl1pPr>
-            <a:lvl2pPr marL="278983" indent="0">
-              <a:buNone/>
-              <a:defRPr sz="854"/>
+            <a:lvl2pPr marL="170398" indent="0">
+              <a:buNone/>
+              <a:defRPr sz="522"/>
             </a:lvl2pPr>
-            <a:lvl3pPr marL="557967" indent="0">
-              <a:buNone/>
-              <a:defRPr sz="732"/>
+            <a:lvl3pPr marL="340797" indent="0">
+              <a:buNone/>
+              <a:defRPr sz="447"/>
             </a:lvl3pPr>
-            <a:lvl4pPr marL="836950" indent="0">
-              <a:buNone/>
-              <a:defRPr sz="610"/>
+            <a:lvl4pPr marL="511195" indent="0">
+              <a:buNone/>
+              <a:defRPr sz="373"/>
             </a:lvl4pPr>
-            <a:lvl5pPr marL="1115934" indent="0">
-              <a:buNone/>
-              <a:defRPr sz="610"/>
+            <a:lvl5pPr marL="681594" indent="0">
+              <a:buNone/>
+              <a:defRPr sz="373"/>
             </a:lvl5pPr>
-            <a:lvl6pPr marL="1394917" indent="0">
-              <a:buNone/>
-              <a:defRPr sz="610"/>
+            <a:lvl6pPr marL="851992" indent="0">
+              <a:buNone/>
+              <a:defRPr sz="373"/>
             </a:lvl6pPr>
-            <a:lvl7pPr marL="1673901" indent="0">
-              <a:buNone/>
-              <a:defRPr sz="610"/>
+            <a:lvl7pPr marL="1022391" indent="0">
+              <a:buNone/>
+              <a:defRPr sz="373"/>
             </a:lvl7pPr>
-            <a:lvl8pPr marL="1952884" indent="0">
-              <a:buNone/>
-              <a:defRPr sz="610"/>
+            <a:lvl8pPr marL="1192789" indent="0">
+              <a:buNone/>
+              <a:defRPr sz="373"/>
             </a:lvl8pPr>
-            <a:lvl9pPr marL="2231868" indent="0">
-              <a:buNone/>
-              <a:defRPr sz="610"/>
+            <a:lvl9pPr marL="1363188" indent="0">
+              <a:buNone/>
+              <a:defRPr sz="373"/>
             </a:lvl9pPr>
           </a:lstStyle>
           <a:p>
@@ -2173,7 +2462,7 @@
           <a:p>
             <a:fld id="{527F55EE-145F-43A8-982A-E7113EE97E9F}" type="datetimeFigureOut">
               <a:rPr lang="en-GB" smtClean="0"/>
-              <a:t>19/04/2022</a:t>
+              <a:t>25/04/2022</a:t>
             </a:fld>
             <a:endParaRPr lang="en-GB"/>
           </a:p>
@@ -2224,7 +2513,7 @@
     </p:spTree>
     <p:extLst>
       <p:ext uri="{BB962C8B-B14F-4D97-AF65-F5344CB8AC3E}">
-        <p14:creationId xmlns:p14="http://schemas.microsoft.com/office/powerpoint/2010/main" val="1085582335"/>
+        <p14:creationId xmlns:p14="http://schemas.microsoft.com/office/powerpoint/2010/main" val="3857055382"/>
       </p:ext>
     </p:extLst>
   </p:cSld>
@@ -2263,15 +2552,15 @@
         </p:nvSpPr>
         <p:spPr>
           <a:xfrm>
-            <a:off x="384356" y="309562"/>
-            <a:ext cx="1799716" cy="1083469"/>
+            <a:off x="354614" y="170392"/>
+            <a:ext cx="1660449" cy="596371"/>
           </a:xfrm>
         </p:spPr>
         <p:txBody>
           <a:bodyPr anchor="b"/>
           <a:lstStyle>
             <a:lvl1pPr>
-              <a:defRPr sz="1953"/>
+              <a:defRPr sz="1193"/>
             </a:lvl1pPr>
           </a:lstStyle>
           <a:p>
@@ -2295,8 +2584,8 @@
         </p:nvSpPr>
         <p:spPr>
           <a:xfrm>
-            <a:off x="2372254" y="668570"/>
-            <a:ext cx="2824907" cy="3299851"/>
+            <a:off x="2188682" y="367999"/>
+            <a:ext cx="2606308" cy="1816328"/>
           </a:xfrm>
         </p:spPr>
         <p:txBody>
@@ -2304,39 +2593,39 @@
           <a:lstStyle>
             <a:lvl1pPr marL="0" indent="0">
               <a:buNone/>
-              <a:defRPr sz="1953"/>
+              <a:defRPr sz="1193"/>
             </a:lvl1pPr>
-            <a:lvl2pPr marL="278983" indent="0">
-              <a:buNone/>
-              <a:defRPr sz="1709"/>
+            <a:lvl2pPr marL="170398" indent="0">
+              <a:buNone/>
+              <a:defRPr sz="1044"/>
             </a:lvl2pPr>
-            <a:lvl3pPr marL="557967" indent="0">
-              <a:buNone/>
-              <a:defRPr sz="1464"/>
+            <a:lvl3pPr marL="340797" indent="0">
+              <a:buNone/>
+              <a:defRPr sz="894"/>
             </a:lvl3pPr>
-            <a:lvl4pPr marL="836950" indent="0">
-              <a:buNone/>
-              <a:defRPr sz="1220"/>
+            <a:lvl4pPr marL="511195" indent="0">
+              <a:buNone/>
+              <a:defRPr sz="745"/>
             </a:lvl4pPr>
-            <a:lvl5pPr marL="1115934" indent="0">
-              <a:buNone/>
-              <a:defRPr sz="1220"/>
+            <a:lvl5pPr marL="681594" indent="0">
+              <a:buNone/>
+              <a:defRPr sz="745"/>
             </a:lvl5pPr>
-            <a:lvl6pPr marL="1394917" indent="0">
-              <a:buNone/>
-              <a:defRPr sz="1220"/>
+            <a:lvl6pPr marL="851992" indent="0">
+              <a:buNone/>
+              <a:defRPr sz="745"/>
             </a:lvl6pPr>
-            <a:lvl7pPr marL="1673901" indent="0">
-              <a:buNone/>
-              <a:defRPr sz="1220"/>
+            <a:lvl7pPr marL="1022391" indent="0">
+              <a:buNone/>
+              <a:defRPr sz="745"/>
             </a:lvl7pPr>
-            <a:lvl8pPr marL="1952884" indent="0">
-              <a:buNone/>
-              <a:defRPr sz="1220"/>
+            <a:lvl8pPr marL="1192789" indent="0">
+              <a:buNone/>
+              <a:defRPr sz="745"/>
             </a:lvl8pPr>
-            <a:lvl9pPr marL="2231868" indent="0">
-              <a:buNone/>
-              <a:defRPr sz="1220"/>
+            <a:lvl9pPr marL="1363188" indent="0">
+              <a:buNone/>
+              <a:defRPr sz="745"/>
             </a:lvl9pPr>
           </a:lstStyle>
           <a:p>
@@ -2360,8 +2649,8 @@
         </p:nvSpPr>
         <p:spPr>
           <a:xfrm>
-            <a:off x="384356" y="1393031"/>
-            <a:ext cx="1799716" cy="2580763"/>
+            <a:off x="354614" y="766763"/>
+            <a:ext cx="1660449" cy="1420522"/>
           </a:xfrm>
         </p:spPr>
         <p:txBody>
@@ -2369,39 +2658,39 @@
           <a:lstStyle>
             <a:lvl1pPr marL="0" indent="0">
               <a:buNone/>
-              <a:defRPr sz="976"/>
+              <a:defRPr sz="596"/>
             </a:lvl1pPr>
-            <a:lvl2pPr marL="278983" indent="0">
-              <a:buNone/>
-              <a:defRPr sz="854"/>
+            <a:lvl2pPr marL="170398" indent="0">
+              <a:buNone/>
+              <a:defRPr sz="522"/>
             </a:lvl2pPr>
-            <a:lvl3pPr marL="557967" indent="0">
-              <a:buNone/>
-              <a:defRPr sz="732"/>
+            <a:lvl3pPr marL="340797" indent="0">
+              <a:buNone/>
+              <a:defRPr sz="447"/>
             </a:lvl3pPr>
-            <a:lvl4pPr marL="836950" indent="0">
-              <a:buNone/>
-              <a:defRPr sz="610"/>
+            <a:lvl4pPr marL="511195" indent="0">
+              <a:buNone/>
+              <a:defRPr sz="373"/>
             </a:lvl4pPr>
-            <a:lvl5pPr marL="1115934" indent="0">
-              <a:buNone/>
-              <a:defRPr sz="610"/>
+            <a:lvl5pPr marL="681594" indent="0">
+              <a:buNone/>
+              <a:defRPr sz="373"/>
             </a:lvl5pPr>
-            <a:lvl6pPr marL="1394917" indent="0">
-              <a:buNone/>
-              <a:defRPr sz="610"/>
+            <a:lvl6pPr marL="851992" indent="0">
+              <a:buNone/>
+              <a:defRPr sz="373"/>
             </a:lvl6pPr>
-            <a:lvl7pPr marL="1673901" indent="0">
-              <a:buNone/>
-              <a:defRPr sz="610"/>
+            <a:lvl7pPr marL="1022391" indent="0">
+              <a:buNone/>
+              <a:defRPr sz="373"/>
             </a:lvl7pPr>
-            <a:lvl8pPr marL="1952884" indent="0">
-              <a:buNone/>
-              <a:defRPr sz="610"/>
+            <a:lvl8pPr marL="1192789" indent="0">
+              <a:buNone/>
+              <a:defRPr sz="373"/>
             </a:lvl8pPr>
-            <a:lvl9pPr marL="2231868" indent="0">
-              <a:buNone/>
-              <a:defRPr sz="610"/>
+            <a:lvl9pPr marL="1363188" indent="0">
+              <a:buNone/>
+              <a:defRPr sz="373"/>
             </a:lvl9pPr>
           </a:lstStyle>
           <a:p>
@@ -2430,7 +2719,7 @@
           <a:p>
             <a:fld id="{527F55EE-145F-43A8-982A-E7113EE97E9F}" type="datetimeFigureOut">
               <a:rPr lang="en-GB" smtClean="0"/>
-              <a:t>19/04/2022</a:t>
+              <a:t>25/04/2022</a:t>
             </a:fld>
             <a:endParaRPr lang="en-GB"/>
           </a:p>
@@ -2481,7 +2770,7 @@
     </p:spTree>
     <p:extLst>
       <p:ext uri="{BB962C8B-B14F-4D97-AF65-F5344CB8AC3E}">
-        <p14:creationId xmlns:p14="http://schemas.microsoft.com/office/powerpoint/2010/main" val="723490614"/>
+        <p14:creationId xmlns:p14="http://schemas.microsoft.com/office/powerpoint/2010/main" val="2040105690"/>
       </p:ext>
     </p:extLst>
   </p:cSld>
@@ -2525,8 +2814,8 @@
         </p:nvSpPr>
         <p:spPr>
           <a:xfrm>
-            <a:off x="383630" y="247221"/>
-            <a:ext cx="4812804" cy="897517"/>
+            <a:off x="353943" y="136077"/>
+            <a:ext cx="4440377" cy="494018"/>
           </a:xfrm>
           <a:prstGeom prst="rect">
             <a:avLst/>
@@ -2558,8 +2847,8 @@
         </p:nvSpPr>
         <p:spPr>
           <a:xfrm>
-            <a:off x="383630" y="1236100"/>
-            <a:ext cx="4812804" cy="2946219"/>
+            <a:off x="353943" y="680383"/>
+            <a:ext cx="4440377" cy="1621679"/>
           </a:xfrm>
           <a:prstGeom prst="rect">
             <a:avLst/>
@@ -2620,8 +2909,8 @@
         </p:nvSpPr>
         <p:spPr>
           <a:xfrm>
-            <a:off x="383629" y="4303780"/>
-            <a:ext cx="1255514" cy="247220"/>
+            <a:off x="353943" y="2368918"/>
+            <a:ext cx="1158359" cy="136077"/>
           </a:xfrm>
           <a:prstGeom prst="rect">
             <a:avLst/>
@@ -2631,7 +2920,7 @@
           <a:bodyPr vert="horz" lIns="91440" tIns="45720" rIns="91440" bIns="45720" rtlCol="0" anchor="ctr"/>
           <a:lstStyle>
             <a:lvl1pPr algn="l">
-              <a:defRPr sz="732">
+              <a:defRPr sz="447">
                 <a:solidFill>
                   <a:schemeClr val="tx1">
                     <a:tint val="75000"/>
@@ -2643,7 +2932,7 @@
           <a:p>
             <a:fld id="{527F55EE-145F-43A8-982A-E7113EE97E9F}" type="datetimeFigureOut">
               <a:rPr lang="en-GB" smtClean="0"/>
-              <a:t>19/04/2022</a:t>
+              <a:t>25/04/2022</a:t>
             </a:fld>
             <a:endParaRPr lang="en-GB"/>
           </a:p>
@@ -2661,8 +2950,8 @@
         </p:nvSpPr>
         <p:spPr>
           <a:xfrm>
-            <a:off x="1848396" y="4303780"/>
-            <a:ext cx="1883271" cy="247220"/>
+            <a:off x="1705362" y="2368918"/>
+            <a:ext cx="1737539" cy="136077"/>
           </a:xfrm>
           <a:prstGeom prst="rect">
             <a:avLst/>
@@ -2672,7 +2961,7 @@
           <a:bodyPr vert="horz" lIns="91440" tIns="45720" rIns="91440" bIns="45720" rtlCol="0" anchor="ctr"/>
           <a:lstStyle>
             <a:lvl1pPr algn="ctr">
-              <a:defRPr sz="732">
+              <a:defRPr sz="447">
                 <a:solidFill>
                   <a:schemeClr val="tx1">
                     <a:tint val="75000"/>
@@ -2698,8 +2987,8 @@
         </p:nvSpPr>
         <p:spPr>
           <a:xfrm>
-            <a:off x="3940920" y="4303780"/>
-            <a:ext cx="1255514" cy="247220"/>
+            <a:off x="3635961" y="2368918"/>
+            <a:ext cx="1158359" cy="136077"/>
           </a:xfrm>
           <a:prstGeom prst="rect">
             <a:avLst/>
@@ -2709,7 +2998,7 @@
           <a:bodyPr vert="horz" lIns="91440" tIns="45720" rIns="91440" bIns="45720" rtlCol="0" anchor="ctr"/>
           <a:lstStyle>
             <a:lvl1pPr algn="r">
-              <a:defRPr sz="732">
+              <a:defRPr sz="447">
                 <a:solidFill>
                   <a:schemeClr val="tx1">
                     <a:tint val="75000"/>
@@ -2730,27 +3019,27 @@
     </p:spTree>
     <p:extLst>
       <p:ext uri="{BB962C8B-B14F-4D97-AF65-F5344CB8AC3E}">
-        <p14:creationId xmlns:p14="http://schemas.microsoft.com/office/powerpoint/2010/main" val="3429664091"/>
+        <p14:creationId xmlns:p14="http://schemas.microsoft.com/office/powerpoint/2010/main" val="944151115"/>
       </p:ext>
     </p:extLst>
   </p:cSld>
   <p:clrMap bg1="lt1" tx1="dk1" bg2="lt2" tx2="dk2" accent1="accent1" accent2="accent2" accent3="accent3" accent4="accent4" accent5="accent5" accent6="accent6" hlink="hlink" folHlink="folHlink"/>
   <p:sldLayoutIdLst>
-    <p:sldLayoutId id="2147483673" r:id="rId1"/>
-    <p:sldLayoutId id="2147483674" r:id="rId2"/>
-    <p:sldLayoutId id="2147483675" r:id="rId3"/>
-    <p:sldLayoutId id="2147483676" r:id="rId4"/>
-    <p:sldLayoutId id="2147483677" r:id="rId5"/>
-    <p:sldLayoutId id="2147483678" r:id="rId6"/>
-    <p:sldLayoutId id="2147483679" r:id="rId7"/>
-    <p:sldLayoutId id="2147483680" r:id="rId8"/>
-    <p:sldLayoutId id="2147483681" r:id="rId9"/>
-    <p:sldLayoutId id="2147483682" r:id="rId10"/>
-    <p:sldLayoutId id="2147483683" r:id="rId11"/>
+    <p:sldLayoutId id="2147483685" r:id="rId1"/>
+    <p:sldLayoutId id="2147483686" r:id="rId2"/>
+    <p:sldLayoutId id="2147483687" r:id="rId3"/>
+    <p:sldLayoutId id="2147483688" r:id="rId4"/>
+    <p:sldLayoutId id="2147483689" r:id="rId5"/>
+    <p:sldLayoutId id="2147483690" r:id="rId6"/>
+    <p:sldLayoutId id="2147483691" r:id="rId7"/>
+    <p:sldLayoutId id="2147483692" r:id="rId8"/>
+    <p:sldLayoutId id="2147483693" r:id="rId9"/>
+    <p:sldLayoutId id="2147483694" r:id="rId10"/>
+    <p:sldLayoutId id="2147483695" r:id="rId11"/>
   </p:sldLayoutIdLst>
   <p:txStyles>
     <p:titleStyle>
-      <a:lvl1pPr algn="l" defTabSz="557967" rtl="0" eaLnBrk="1" latinLnBrk="0" hangingPunct="1">
+      <a:lvl1pPr algn="l" defTabSz="340797" rtl="0" eaLnBrk="1" latinLnBrk="0" hangingPunct="1">
         <a:lnSpc>
           <a:spcPct val="90000"/>
         </a:lnSpc>
@@ -2758,7 +3047,7 @@
           <a:spcPct val="0"/>
         </a:spcBef>
         <a:buNone/>
-        <a:defRPr sz="2685" kern="1200">
+        <a:defRPr sz="1640" kern="1200">
           <a:solidFill>
             <a:schemeClr val="tx1"/>
           </a:solidFill>
@@ -2769,16 +3058,16 @@
       </a:lvl1pPr>
     </p:titleStyle>
     <p:bodyStyle>
-      <a:lvl1pPr marL="139492" indent="-139492" algn="l" defTabSz="557967" rtl="0" eaLnBrk="1" latinLnBrk="0" hangingPunct="1">
+      <a:lvl1pPr marL="85199" indent="-85199" algn="l" defTabSz="340797" rtl="0" eaLnBrk="1" latinLnBrk="0" hangingPunct="1">
         <a:lnSpc>
           <a:spcPct val="90000"/>
         </a:lnSpc>
         <a:spcBef>
-          <a:spcPts val="610"/>
+          <a:spcPts val="373"/>
         </a:spcBef>
         <a:buFont typeface="Arial" panose="020B0604020202020204" pitchFamily="34" charset="0"/>
         <a:buChar char="•"/>
-        <a:defRPr sz="1709" kern="1200">
+        <a:defRPr sz="1044" kern="1200">
           <a:solidFill>
             <a:schemeClr val="tx1"/>
           </a:solidFill>
@@ -2787,16 +3076,16 @@
           <a:cs typeface="+mn-cs"/>
         </a:defRPr>
       </a:lvl1pPr>
-      <a:lvl2pPr marL="418475" indent="-139492" algn="l" defTabSz="557967" rtl="0" eaLnBrk="1" latinLnBrk="0" hangingPunct="1">
+      <a:lvl2pPr marL="255598" indent="-85199" algn="l" defTabSz="340797" rtl="0" eaLnBrk="1" latinLnBrk="0" hangingPunct="1">
         <a:lnSpc>
           <a:spcPct val="90000"/>
         </a:lnSpc>
         <a:spcBef>
-          <a:spcPts val="305"/>
+          <a:spcPts val="186"/>
         </a:spcBef>
         <a:buFont typeface="Arial" panose="020B0604020202020204" pitchFamily="34" charset="0"/>
         <a:buChar char="•"/>
-        <a:defRPr sz="1464" kern="1200">
+        <a:defRPr sz="894" kern="1200">
           <a:solidFill>
             <a:schemeClr val="tx1"/>
           </a:solidFill>
@@ -2805,16 +3094,16 @@
           <a:cs typeface="+mn-cs"/>
         </a:defRPr>
       </a:lvl2pPr>
-      <a:lvl3pPr marL="697459" indent="-139492" algn="l" defTabSz="557967" rtl="0" eaLnBrk="1" latinLnBrk="0" hangingPunct="1">
+      <a:lvl3pPr marL="425996" indent="-85199" algn="l" defTabSz="340797" rtl="0" eaLnBrk="1" latinLnBrk="0" hangingPunct="1">
         <a:lnSpc>
           <a:spcPct val="90000"/>
         </a:lnSpc>
         <a:spcBef>
-          <a:spcPts val="305"/>
+          <a:spcPts val="186"/>
         </a:spcBef>
         <a:buFont typeface="Arial" panose="020B0604020202020204" pitchFamily="34" charset="0"/>
         <a:buChar char="•"/>
-        <a:defRPr sz="1220" kern="1200">
+        <a:defRPr sz="745" kern="1200">
           <a:solidFill>
             <a:schemeClr val="tx1"/>
           </a:solidFill>
@@ -2823,16 +3112,16 @@
           <a:cs typeface="+mn-cs"/>
         </a:defRPr>
       </a:lvl3pPr>
-      <a:lvl4pPr marL="976442" indent="-139492" algn="l" defTabSz="557967" rtl="0" eaLnBrk="1" latinLnBrk="0" hangingPunct="1">
+      <a:lvl4pPr marL="596395" indent="-85199" algn="l" defTabSz="340797" rtl="0" eaLnBrk="1" latinLnBrk="0" hangingPunct="1">
         <a:lnSpc>
           <a:spcPct val="90000"/>
         </a:lnSpc>
         <a:spcBef>
-          <a:spcPts val="305"/>
+          <a:spcPts val="186"/>
         </a:spcBef>
         <a:buFont typeface="Arial" panose="020B0604020202020204" pitchFamily="34" charset="0"/>
         <a:buChar char="•"/>
-        <a:defRPr sz="1098" kern="1200">
+        <a:defRPr sz="671" kern="1200">
           <a:solidFill>
             <a:schemeClr val="tx1"/>
           </a:solidFill>
@@ -2841,16 +3130,16 @@
           <a:cs typeface="+mn-cs"/>
         </a:defRPr>
       </a:lvl4pPr>
-      <a:lvl5pPr marL="1255425" indent="-139492" algn="l" defTabSz="557967" rtl="0" eaLnBrk="1" latinLnBrk="0" hangingPunct="1">
+      <a:lvl5pPr marL="766793" indent="-85199" algn="l" defTabSz="340797" rtl="0" eaLnBrk="1" latinLnBrk="0" hangingPunct="1">
         <a:lnSpc>
           <a:spcPct val="90000"/>
         </a:lnSpc>
         <a:spcBef>
-          <a:spcPts val="305"/>
+          <a:spcPts val="186"/>
         </a:spcBef>
         <a:buFont typeface="Arial" panose="020B0604020202020204" pitchFamily="34" charset="0"/>
         <a:buChar char="•"/>
-        <a:defRPr sz="1098" kern="1200">
+        <a:defRPr sz="671" kern="1200">
           <a:solidFill>
             <a:schemeClr val="tx1"/>
           </a:solidFill>
@@ -2859,16 +3148,16 @@
           <a:cs typeface="+mn-cs"/>
         </a:defRPr>
       </a:lvl5pPr>
-      <a:lvl6pPr marL="1534409" indent="-139492" algn="l" defTabSz="557967" rtl="0" eaLnBrk="1" latinLnBrk="0" hangingPunct="1">
+      <a:lvl6pPr marL="937191" indent="-85199" algn="l" defTabSz="340797" rtl="0" eaLnBrk="1" latinLnBrk="0" hangingPunct="1">
         <a:lnSpc>
           <a:spcPct val="90000"/>
         </a:lnSpc>
         <a:spcBef>
-          <a:spcPts val="305"/>
+          <a:spcPts val="186"/>
         </a:spcBef>
         <a:buFont typeface="Arial" panose="020B0604020202020204" pitchFamily="34" charset="0"/>
         <a:buChar char="•"/>
-        <a:defRPr sz="1098" kern="1200">
+        <a:defRPr sz="671" kern="1200">
           <a:solidFill>
             <a:schemeClr val="tx1"/>
           </a:solidFill>
@@ -2877,16 +3166,16 @@
           <a:cs typeface="+mn-cs"/>
         </a:defRPr>
       </a:lvl6pPr>
-      <a:lvl7pPr marL="1813392" indent="-139492" algn="l" defTabSz="557967" rtl="0" eaLnBrk="1" latinLnBrk="0" hangingPunct="1">
+      <a:lvl7pPr marL="1107590" indent="-85199" algn="l" defTabSz="340797" rtl="0" eaLnBrk="1" latinLnBrk="0" hangingPunct="1">
         <a:lnSpc>
           <a:spcPct val="90000"/>
         </a:lnSpc>
         <a:spcBef>
-          <a:spcPts val="305"/>
+          <a:spcPts val="186"/>
         </a:spcBef>
         <a:buFont typeface="Arial" panose="020B0604020202020204" pitchFamily="34" charset="0"/>
         <a:buChar char="•"/>
-        <a:defRPr sz="1098" kern="1200">
+        <a:defRPr sz="671" kern="1200">
           <a:solidFill>
             <a:schemeClr val="tx1"/>
           </a:solidFill>
@@ -2895,16 +3184,16 @@
           <a:cs typeface="+mn-cs"/>
         </a:defRPr>
       </a:lvl7pPr>
-      <a:lvl8pPr marL="2092376" indent="-139492" algn="l" defTabSz="557967" rtl="0" eaLnBrk="1" latinLnBrk="0" hangingPunct="1">
+      <a:lvl8pPr marL="1277988" indent="-85199" algn="l" defTabSz="340797" rtl="0" eaLnBrk="1" latinLnBrk="0" hangingPunct="1">
         <a:lnSpc>
           <a:spcPct val="90000"/>
         </a:lnSpc>
         <a:spcBef>
-          <a:spcPts val="305"/>
+          <a:spcPts val="186"/>
         </a:spcBef>
         <a:buFont typeface="Arial" panose="020B0604020202020204" pitchFamily="34" charset="0"/>
         <a:buChar char="•"/>
-        <a:defRPr sz="1098" kern="1200">
+        <a:defRPr sz="671" kern="1200">
           <a:solidFill>
             <a:schemeClr val="tx1"/>
           </a:solidFill>
@@ -2913,16 +3202,16 @@
           <a:cs typeface="+mn-cs"/>
         </a:defRPr>
       </a:lvl8pPr>
-      <a:lvl9pPr marL="2371359" indent="-139492" algn="l" defTabSz="557967" rtl="0" eaLnBrk="1" latinLnBrk="0" hangingPunct="1">
+      <a:lvl9pPr marL="1448387" indent="-85199" algn="l" defTabSz="340797" rtl="0" eaLnBrk="1" latinLnBrk="0" hangingPunct="1">
         <a:lnSpc>
           <a:spcPct val="90000"/>
         </a:lnSpc>
         <a:spcBef>
-          <a:spcPts val="305"/>
+          <a:spcPts val="186"/>
         </a:spcBef>
         <a:buFont typeface="Arial" panose="020B0604020202020204" pitchFamily="34" charset="0"/>
         <a:buChar char="•"/>
-        <a:defRPr sz="1098" kern="1200">
+        <a:defRPr sz="671" kern="1200">
           <a:solidFill>
             <a:schemeClr val="tx1"/>
           </a:solidFill>
@@ -2936,8 +3225,8 @@
       <a:defPPr>
         <a:defRPr lang="en-US"/>
       </a:defPPr>
-      <a:lvl1pPr marL="0" algn="l" defTabSz="557967" rtl="0" eaLnBrk="1" latinLnBrk="0" hangingPunct="1">
-        <a:defRPr sz="1098" kern="1200">
+      <a:lvl1pPr marL="0" algn="l" defTabSz="340797" rtl="0" eaLnBrk="1" latinLnBrk="0" hangingPunct="1">
+        <a:defRPr sz="671" kern="1200">
           <a:solidFill>
             <a:schemeClr val="tx1"/>
           </a:solidFill>
@@ -2946,8 +3235,8 @@
           <a:cs typeface="+mn-cs"/>
         </a:defRPr>
       </a:lvl1pPr>
-      <a:lvl2pPr marL="278983" algn="l" defTabSz="557967" rtl="0" eaLnBrk="1" latinLnBrk="0" hangingPunct="1">
-        <a:defRPr sz="1098" kern="1200">
+      <a:lvl2pPr marL="170398" algn="l" defTabSz="340797" rtl="0" eaLnBrk="1" latinLnBrk="0" hangingPunct="1">
+        <a:defRPr sz="671" kern="1200">
           <a:solidFill>
             <a:schemeClr val="tx1"/>
           </a:solidFill>
@@ -2956,8 +3245,8 @@
           <a:cs typeface="+mn-cs"/>
         </a:defRPr>
       </a:lvl2pPr>
-      <a:lvl3pPr marL="557967" algn="l" defTabSz="557967" rtl="0" eaLnBrk="1" latinLnBrk="0" hangingPunct="1">
-        <a:defRPr sz="1098" kern="1200">
+      <a:lvl3pPr marL="340797" algn="l" defTabSz="340797" rtl="0" eaLnBrk="1" latinLnBrk="0" hangingPunct="1">
+        <a:defRPr sz="671" kern="1200">
           <a:solidFill>
             <a:schemeClr val="tx1"/>
           </a:solidFill>
@@ -2966,8 +3255,8 @@
           <a:cs typeface="+mn-cs"/>
         </a:defRPr>
       </a:lvl3pPr>
-      <a:lvl4pPr marL="836950" algn="l" defTabSz="557967" rtl="0" eaLnBrk="1" latinLnBrk="0" hangingPunct="1">
-        <a:defRPr sz="1098" kern="1200">
+      <a:lvl4pPr marL="511195" algn="l" defTabSz="340797" rtl="0" eaLnBrk="1" latinLnBrk="0" hangingPunct="1">
+        <a:defRPr sz="671" kern="1200">
           <a:solidFill>
             <a:schemeClr val="tx1"/>
           </a:solidFill>
@@ -2976,8 +3265,8 @@
           <a:cs typeface="+mn-cs"/>
         </a:defRPr>
       </a:lvl4pPr>
-      <a:lvl5pPr marL="1115934" algn="l" defTabSz="557967" rtl="0" eaLnBrk="1" latinLnBrk="0" hangingPunct="1">
-        <a:defRPr sz="1098" kern="1200">
+      <a:lvl5pPr marL="681594" algn="l" defTabSz="340797" rtl="0" eaLnBrk="1" latinLnBrk="0" hangingPunct="1">
+        <a:defRPr sz="671" kern="1200">
           <a:solidFill>
             <a:schemeClr val="tx1"/>
           </a:solidFill>
@@ -2986,8 +3275,8 @@
           <a:cs typeface="+mn-cs"/>
         </a:defRPr>
       </a:lvl5pPr>
-      <a:lvl6pPr marL="1394917" algn="l" defTabSz="557967" rtl="0" eaLnBrk="1" latinLnBrk="0" hangingPunct="1">
-        <a:defRPr sz="1098" kern="1200">
+      <a:lvl6pPr marL="851992" algn="l" defTabSz="340797" rtl="0" eaLnBrk="1" latinLnBrk="0" hangingPunct="1">
+        <a:defRPr sz="671" kern="1200">
           <a:solidFill>
             <a:schemeClr val="tx1"/>
           </a:solidFill>
@@ -2996,8 +3285,8 @@
           <a:cs typeface="+mn-cs"/>
         </a:defRPr>
       </a:lvl6pPr>
-      <a:lvl7pPr marL="1673901" algn="l" defTabSz="557967" rtl="0" eaLnBrk="1" latinLnBrk="0" hangingPunct="1">
-        <a:defRPr sz="1098" kern="1200">
+      <a:lvl7pPr marL="1022391" algn="l" defTabSz="340797" rtl="0" eaLnBrk="1" latinLnBrk="0" hangingPunct="1">
+        <a:defRPr sz="671" kern="1200">
           <a:solidFill>
             <a:schemeClr val="tx1"/>
           </a:solidFill>
@@ -3006,8 +3295,8 @@
           <a:cs typeface="+mn-cs"/>
         </a:defRPr>
       </a:lvl7pPr>
-      <a:lvl8pPr marL="1952884" algn="l" defTabSz="557967" rtl="0" eaLnBrk="1" latinLnBrk="0" hangingPunct="1">
-        <a:defRPr sz="1098" kern="1200">
+      <a:lvl8pPr marL="1192789" algn="l" defTabSz="340797" rtl="0" eaLnBrk="1" latinLnBrk="0" hangingPunct="1">
+        <a:defRPr sz="671" kern="1200">
           <a:solidFill>
             <a:schemeClr val="tx1"/>
           </a:solidFill>
@@ -3016,8 +3305,8 @@
           <a:cs typeface="+mn-cs"/>
         </a:defRPr>
       </a:lvl8pPr>
-      <a:lvl9pPr marL="2231868" algn="l" defTabSz="557967" rtl="0" eaLnBrk="1" latinLnBrk="0" hangingPunct="1">
-        <a:defRPr sz="1098" kern="1200">
+      <a:lvl9pPr marL="1363188" algn="l" defTabSz="340797" rtl="0" eaLnBrk="1" latinLnBrk="0" hangingPunct="1">
+        <a:defRPr sz="671" kern="1200">
           <a:solidFill>
             <a:schemeClr val="tx1"/>
           </a:solidFill>
@@ -3050,10 +3339,10 @@
       </p:grpSpPr>
       <p:pic>
         <p:nvPicPr>
-          <p:cNvPr id="38" name="Picture 37" descr="Chart, line chart&#10;&#10;Description automatically generated">
+          <p:cNvPr id="16" name="Picture 15" descr="Chart, line chart&#10;&#10;Description automatically generated">
             <a:extLst>
               <a:ext uri="{FF2B5EF4-FFF2-40B4-BE49-F238E27FC236}">
-                <a16:creationId xmlns:a16="http://schemas.microsoft.com/office/drawing/2014/main" id="{0693A79C-886E-40EA-916E-4EF9B3B17D67}"/>
+                <a16:creationId xmlns:a16="http://schemas.microsoft.com/office/drawing/2014/main" id="{0C43CF89-B007-4BCF-A02C-3ACF15266C35}"/>
               </a:ext>
             </a:extLst>
           </p:cNvPr>
@@ -3062,7 +3351,7 @@
           </p:cNvPicPr>
           <p:nvPr/>
         </p:nvPicPr>
-        <p:blipFill>
+        <p:blipFill rotWithShape="1">
           <a:blip r:embed="rId2">
             <a:extLst>
               <a:ext uri="{28A0092B-C50C-407E-A947-70E740481C1C}">
@@ -3070,14 +3359,13 @@
               </a:ext>
             </a:extLst>
           </a:blip>
-          <a:stretch>
-            <a:fillRect/>
-          </a:stretch>
+          <a:srcRect l="6570" t="5400" r="8764" b="4161"/>
+          <a:stretch/>
         </p:blipFill>
         <p:spPr>
           <a:xfrm>
-            <a:off x="220021" y="2345514"/>
-            <a:ext cx="2880000" cy="2160246"/>
+            <a:off x="199554" y="390681"/>
+            <a:ext cx="2438401" cy="1953718"/>
           </a:xfrm>
           <a:prstGeom prst="rect">
             <a:avLst/>
@@ -3086,10 +3374,10 @@
       </p:pic>
       <p:pic>
         <p:nvPicPr>
-          <p:cNvPr id="39" name="Picture 38" descr="Chart, line chart&#10;&#10;Description automatically generated">
+          <p:cNvPr id="17" name="Picture 16" descr="Chart, line chart&#10;&#10;Description automatically generated">
             <a:extLst>
               <a:ext uri="{FF2B5EF4-FFF2-40B4-BE49-F238E27FC236}">
-                <a16:creationId xmlns:a16="http://schemas.microsoft.com/office/drawing/2014/main" id="{CA42449E-3B96-4E9B-818E-C5BAB5FE66EA}"/>
+                <a16:creationId xmlns:a16="http://schemas.microsoft.com/office/drawing/2014/main" id="{0CF265B3-1DA6-4317-84FD-BAB4FAFE59B5}"/>
               </a:ext>
             </a:extLst>
           </p:cNvPr>
@@ -3106,13 +3394,13 @@
               </a:ext>
             </a:extLst>
           </a:blip>
-          <a:srcRect r="5771"/>
+          <a:srcRect l="6570" t="5400" r="8764" b="4161"/>
           <a:stretch/>
         </p:blipFill>
         <p:spPr>
           <a:xfrm>
-            <a:off x="2872409" y="2345514"/>
-            <a:ext cx="2713792" cy="2160246"/>
+            <a:off x="2672933" y="390681"/>
+            <a:ext cx="2438400" cy="1953718"/>
           </a:xfrm>
           <a:prstGeom prst="rect">
             <a:avLst/>
@@ -3121,10 +3409,10 @@
       </p:pic>
       <p:sp>
         <p:nvSpPr>
-          <p:cNvPr id="40" name="TextBox 39">
+          <p:cNvPr id="18" name="TextBox 17">
             <a:extLst>
               <a:ext uri="{FF2B5EF4-FFF2-40B4-BE49-F238E27FC236}">
-                <a16:creationId xmlns:a16="http://schemas.microsoft.com/office/drawing/2014/main" id="{DDF829B2-9654-4D5C-9630-D18C62DB0469}"/>
+                <a16:creationId xmlns:a16="http://schemas.microsoft.com/office/drawing/2014/main" id="{0E6BD9C9-21F8-4A20-A88C-443A9DEDD7FE}"/>
               </a:ext>
             </a:extLst>
           </p:cNvPr>
@@ -3133,8 +3421,8 @@
         </p:nvSpPr>
         <p:spPr>
           <a:xfrm>
-            <a:off x="-55417" y="416513"/>
-            <a:ext cx="307777" cy="2046760"/>
+            <a:off x="-71904" y="390681"/>
+            <a:ext cx="307777" cy="1800069"/>
           </a:xfrm>
           <a:prstGeom prst="rect">
             <a:avLst/>
@@ -3149,19 +3437,19 @@
           <a:p>
             <a:pPr algn="ctr"/>
             <a:r>
-              <a:rPr lang="en-US" sz="800" b="1" dirty="0"/>
-              <a:t>ENS</a:t>
-            </a:r>
-            <a:endParaRPr lang="en-GB" sz="800" b="1" dirty="0"/>
-          </a:p>
-        </p:txBody>
-      </p:sp>
-      <p:sp>
-        <p:nvSpPr>
-          <p:cNvPr id="41" name="TextBox 40">
+              <a:rPr lang="en-US" sz="800" dirty="0"/>
+              <a:t>Hit Rate</a:t>
+            </a:r>
+            <a:endParaRPr lang="en-GB" sz="800" dirty="0"/>
+          </a:p>
+        </p:txBody>
+      </p:sp>
+      <p:sp>
+        <p:nvSpPr>
+          <p:cNvPr id="19" name="TextBox 18">
             <a:extLst>
               <a:ext uri="{FF2B5EF4-FFF2-40B4-BE49-F238E27FC236}">
-                <a16:creationId xmlns:a16="http://schemas.microsoft.com/office/drawing/2014/main" id="{A5548906-5045-4AE1-85B6-31BC723F1210}"/>
+                <a16:creationId xmlns:a16="http://schemas.microsoft.com/office/drawing/2014/main" id="{AFBA44B8-7770-468F-AC4D-C819ABA89710}"/>
               </a:ext>
             </a:extLst>
           </p:cNvPr>
@@ -3170,8 +3458,8 @@
         </p:nvSpPr>
         <p:spPr>
           <a:xfrm>
-            <a:off x="-49769" y="2345514"/>
-            <a:ext cx="307777" cy="2046760"/>
+            <a:off x="380999" y="2344399"/>
+            <a:ext cx="2256955" cy="215444"/>
           </a:xfrm>
           <a:prstGeom prst="rect">
             <a:avLst/>
@@ -3179,26 +3467,26 @@
           <a:noFill/>
         </p:spPr>
         <p:txBody>
-          <a:bodyPr vert="vert270" wrap="square" rtlCol="0">
+          <a:bodyPr wrap="square" rtlCol="0">
             <a:spAutoFit/>
           </a:bodyPr>
           <a:lstStyle/>
           <a:p>
             <a:pPr algn="ctr"/>
             <a:r>
-              <a:rPr lang="en-US" sz="800" b="1" dirty="0"/>
-              <a:t>ecPoint</a:t>
-            </a:r>
-            <a:endParaRPr lang="en-GB" sz="800" b="1" dirty="0"/>
-          </a:p>
-        </p:txBody>
-      </p:sp>
-      <p:sp>
-        <p:nvSpPr>
-          <p:cNvPr id="42" name="TextBox 41">
+              <a:rPr lang="en-US" sz="800" dirty="0"/>
+              <a:t>False Alarm Rate</a:t>
+            </a:r>
+            <a:endParaRPr lang="en-GB" sz="800" dirty="0"/>
+          </a:p>
+        </p:txBody>
+      </p:sp>
+      <p:sp>
+        <p:nvSpPr>
+          <p:cNvPr id="20" name="TextBox 19">
             <a:extLst>
               <a:ext uri="{FF2B5EF4-FFF2-40B4-BE49-F238E27FC236}">
-                <a16:creationId xmlns:a16="http://schemas.microsoft.com/office/drawing/2014/main" id="{5983D359-1552-46F1-A62C-DAD8CACBE018}"/>
+                <a16:creationId xmlns:a16="http://schemas.microsoft.com/office/drawing/2014/main" id="{E6F596F5-5601-42F8-A496-8E7A754BB188}"/>
               </a:ext>
             </a:extLst>
           </p:cNvPr>
@@ -3207,8 +3495,95 @@
         </p:nvSpPr>
         <p:spPr>
           <a:xfrm>
-            <a:off x="127572" y="2345514"/>
-            <a:ext cx="307777" cy="2046760"/>
+            <a:off x="2332277" y="1899106"/>
+            <a:ext cx="215445" cy="215444"/>
+          </a:xfrm>
+          <a:prstGeom prst="rect">
+            <a:avLst/>
+          </a:prstGeom>
+          <a:solidFill>
+            <a:schemeClr val="bg1"/>
+          </a:solidFill>
+          <a:ln>
+            <a:solidFill>
+              <a:schemeClr val="tx1"/>
+            </a:solidFill>
+          </a:ln>
+        </p:spPr>
+        <p:txBody>
+          <a:bodyPr wrap="square" rtlCol="0">
+            <a:spAutoFit/>
+          </a:bodyPr>
+          <a:lstStyle/>
+          <a:p>
+            <a:pPr algn="ctr"/>
+            <a:r>
+              <a:rPr lang="en-GB" sz="800" dirty="0"/>
+              <a:t>a</a:t>
+            </a:r>
+          </a:p>
+        </p:txBody>
+      </p:sp>
+      <p:sp>
+        <p:nvSpPr>
+          <p:cNvPr id="21" name="TextBox 20">
+            <a:extLst>
+              <a:ext uri="{FF2B5EF4-FFF2-40B4-BE49-F238E27FC236}">
+                <a16:creationId xmlns:a16="http://schemas.microsoft.com/office/drawing/2014/main" id="{BB1B2AB8-A98F-44A1-BFD0-A6DEEF3D7F50}"/>
+              </a:ext>
+            </a:extLst>
+          </p:cNvPr>
+          <p:cNvSpPr txBox="1"/>
+          <p:nvPr/>
+        </p:nvSpPr>
+        <p:spPr>
+          <a:xfrm>
+            <a:off x="4831908" y="1899106"/>
+            <a:ext cx="215445" cy="215444"/>
+          </a:xfrm>
+          <a:prstGeom prst="rect">
+            <a:avLst/>
+          </a:prstGeom>
+          <a:solidFill>
+            <a:schemeClr val="bg1"/>
+          </a:solidFill>
+          <a:ln>
+            <a:solidFill>
+              <a:schemeClr val="tx1"/>
+            </a:solidFill>
+          </a:ln>
+        </p:spPr>
+        <p:txBody>
+          <a:bodyPr wrap="square" rtlCol="0">
+            <a:spAutoFit/>
+          </a:bodyPr>
+          <a:lstStyle/>
+          <a:p>
+            <a:pPr algn="ctr"/>
+            <a:r>
+              <a:rPr lang="en-US" sz="800" dirty="0"/>
+              <a:t>b</a:t>
+            </a:r>
+            <a:endParaRPr lang="en-GB" sz="800" dirty="0"/>
+          </a:p>
+        </p:txBody>
+      </p:sp>
+      <p:sp>
+        <p:nvSpPr>
+          <p:cNvPr id="22" name="TextBox 21">
+            <a:extLst>
+              <a:ext uri="{FF2B5EF4-FFF2-40B4-BE49-F238E27FC236}">
+                <a16:creationId xmlns:a16="http://schemas.microsoft.com/office/drawing/2014/main" id="{6ECB3C22-C4D2-4D7C-BD30-CBB752F08378}"/>
+              </a:ext>
+            </a:extLst>
+          </p:cNvPr>
+          <p:cNvSpPr txBox="1"/>
+          <p:nvPr/>
+        </p:nvSpPr>
+        <p:spPr>
+          <a:xfrm>
+            <a:off x="380999" y="175237"/>
+            <a:ext cx="2256955" cy="215444"/>
           </a:xfrm>
           <a:prstGeom prst="rect">
             <a:avLst/>
@@ -3216,26 +3591,26 @@
           <a:noFill/>
         </p:spPr>
         <p:txBody>
-          <a:bodyPr vert="vert270" wrap="square" rtlCol="0">
+          <a:bodyPr wrap="square" rtlCol="0">
             <a:spAutoFit/>
           </a:bodyPr>
           <a:lstStyle/>
           <a:p>
             <a:pPr algn="ctr"/>
             <a:r>
-              <a:rPr lang="en-US" sz="800" dirty="0"/>
-              <a:t>Hit Rate</a:t>
-            </a:r>
-            <a:endParaRPr lang="en-GB" sz="800" dirty="0"/>
-          </a:p>
-        </p:txBody>
-      </p:sp>
-      <p:sp>
-        <p:nvSpPr>
-          <p:cNvPr id="43" name="TextBox 42">
+              <a:rPr lang="en-US" sz="800" b="1" dirty="0"/>
+              <a:t>“La Costa”</a:t>
+            </a:r>
+            <a:endParaRPr lang="en-GB" sz="800" b="1" dirty="0"/>
+          </a:p>
+        </p:txBody>
+      </p:sp>
+      <p:sp>
+        <p:nvSpPr>
+          <p:cNvPr id="23" name="TextBox 22">
             <a:extLst>
               <a:ext uri="{FF2B5EF4-FFF2-40B4-BE49-F238E27FC236}">
-                <a16:creationId xmlns:a16="http://schemas.microsoft.com/office/drawing/2014/main" id="{EC4F1DFA-2EAB-4BCE-93C0-C1EF18D94C99}"/>
+                <a16:creationId xmlns:a16="http://schemas.microsoft.com/office/drawing/2014/main" id="{B47C0308-D061-4C0D-9E2A-C54B6573C9BF}"/>
               </a:ext>
             </a:extLst>
           </p:cNvPr>
@@ -3244,8 +3619,8 @@
         </p:nvSpPr>
         <p:spPr>
           <a:xfrm>
-            <a:off x="547949" y="4430354"/>
-            <a:ext cx="2324460" cy="215444"/>
+            <a:off x="2819399" y="175237"/>
+            <a:ext cx="2291934" cy="215444"/>
           </a:xfrm>
           <a:prstGeom prst="rect">
             <a:avLst/>
@@ -3260,56 +3635,19 @@
           <a:p>
             <a:pPr algn="ctr"/>
             <a:r>
-              <a:rPr lang="en-US" sz="800" dirty="0"/>
-              <a:t>False Alarm Rate</a:t>
-            </a:r>
-            <a:endParaRPr lang="en-GB" sz="800" dirty="0"/>
-          </a:p>
-        </p:txBody>
-      </p:sp>
-      <p:sp>
-        <p:nvSpPr>
-          <p:cNvPr id="44" name="TextBox 43">
+              <a:rPr lang="en-US" sz="800" b="1" dirty="0"/>
+              <a:t>“La Sierra”</a:t>
+            </a:r>
+            <a:endParaRPr lang="en-GB" sz="800" b="1" dirty="0"/>
+          </a:p>
+        </p:txBody>
+      </p:sp>
+      <p:cxnSp>
+        <p:nvCxnSpPr>
+          <p:cNvPr id="24" name="Straight Connector 23">
             <a:extLst>
               <a:ext uri="{FF2B5EF4-FFF2-40B4-BE49-F238E27FC236}">
-                <a16:creationId xmlns:a16="http://schemas.microsoft.com/office/drawing/2014/main" id="{D6E04820-569F-4985-9FE6-DC8795E3CA59}"/>
-              </a:ext>
-            </a:extLst>
-          </p:cNvPr>
-          <p:cNvSpPr txBox="1"/>
-          <p:nvPr/>
-        </p:nvSpPr>
-        <p:spPr>
-          <a:xfrm>
-            <a:off x="3261741" y="4430354"/>
-            <a:ext cx="2324460" cy="215444"/>
-          </a:xfrm>
-          <a:prstGeom prst="rect">
-            <a:avLst/>
-          </a:prstGeom>
-          <a:noFill/>
-        </p:spPr>
-        <p:txBody>
-          <a:bodyPr wrap="square" rtlCol="0">
-            <a:spAutoFit/>
-          </a:bodyPr>
-          <a:lstStyle/>
-          <a:p>
-            <a:pPr algn="ctr"/>
-            <a:r>
-              <a:rPr lang="en-US" sz="800" dirty="0"/>
-              <a:t>False Alarm Rate</a:t>
-            </a:r>
-            <a:endParaRPr lang="en-GB" sz="800" dirty="0"/>
-          </a:p>
-        </p:txBody>
-      </p:sp>
-      <p:cxnSp>
-        <p:nvCxnSpPr>
-          <p:cNvPr id="45" name="Straight Connector 44">
-            <a:extLst>
-              <a:ext uri="{FF2B5EF4-FFF2-40B4-BE49-F238E27FC236}">
-                <a16:creationId xmlns:a16="http://schemas.microsoft.com/office/drawing/2014/main" id="{A998A0E6-D788-4B77-8220-D699CD1C6647}"/>
+                <a16:creationId xmlns:a16="http://schemas.microsoft.com/office/drawing/2014/main" id="{CB89CF1D-7E9E-4766-AE20-A47B8EDB91A0}"/>
               </a:ext>
             </a:extLst>
           </p:cNvPr>
@@ -3320,7 +3658,7 @@
         </p:nvCxnSpPr>
         <p:spPr>
           <a:xfrm>
-            <a:off x="1839933" y="115826"/>
+            <a:off x="1439883" y="96776"/>
             <a:ext cx="72000" cy="0"/>
           </a:xfrm>
           <a:prstGeom prst="line">
@@ -3349,10 +3687,10 @@
       </p:cxnSp>
       <p:sp>
         <p:nvSpPr>
-          <p:cNvPr id="46" name="TextBox 45">
+          <p:cNvPr id="25" name="TextBox 24">
             <a:extLst>
               <a:ext uri="{FF2B5EF4-FFF2-40B4-BE49-F238E27FC236}">
-                <a16:creationId xmlns:a16="http://schemas.microsoft.com/office/drawing/2014/main" id="{A4A34E27-E53F-4C1E-AE7B-FC57309388F6}"/>
+                <a16:creationId xmlns:a16="http://schemas.microsoft.com/office/drawing/2014/main" id="{FCF00110-16E8-4AB1-A591-40E00A1A7C57}"/>
               </a:ext>
             </a:extLst>
           </p:cNvPr>
@@ -3361,7 +3699,7 @@
         </p:nvSpPr>
         <p:spPr>
           <a:xfrm>
-            <a:off x="1855109" y="8104"/>
+            <a:off x="1455059" y="-10946"/>
             <a:ext cx="1135548" cy="215444"/>
           </a:xfrm>
           <a:prstGeom prst="rect">
@@ -3377,7 +3715,7 @@
           <a:p>
             <a:r>
               <a:rPr lang="en-GB" sz="800" dirty="0"/>
-              <a:t>85</a:t>
+              <a:t>ENS 85</a:t>
             </a:r>
             <a:r>
               <a:rPr lang="en-GB" sz="800" baseline="30000" dirty="0"/>
@@ -3392,10 +3730,10 @@
       </p:sp>
       <p:cxnSp>
         <p:nvCxnSpPr>
-          <p:cNvPr id="47" name="Straight Connector 46">
+          <p:cNvPr id="26" name="Straight Connector 25">
             <a:extLst>
               <a:ext uri="{FF2B5EF4-FFF2-40B4-BE49-F238E27FC236}">
-                <a16:creationId xmlns:a16="http://schemas.microsoft.com/office/drawing/2014/main" id="{45FE139A-3A7E-46FD-AE20-C2BF063B6410}"/>
+                <a16:creationId xmlns:a16="http://schemas.microsoft.com/office/drawing/2014/main" id="{DFC99975-8DF3-4F98-A91E-E9F5CB389506}"/>
               </a:ext>
             </a:extLst>
           </p:cNvPr>
@@ -3406,7 +3744,7 @@
         </p:nvCxnSpPr>
         <p:spPr>
           <a:xfrm>
-            <a:off x="3037178" y="110597"/>
+            <a:off x="2637128" y="91547"/>
             <a:ext cx="72000" cy="0"/>
           </a:xfrm>
           <a:prstGeom prst="line">
@@ -3435,10 +3773,10 @@
       </p:cxnSp>
       <p:sp>
         <p:nvSpPr>
-          <p:cNvPr id="48" name="TextBox 47">
+          <p:cNvPr id="27" name="TextBox 26">
             <a:extLst>
               <a:ext uri="{FF2B5EF4-FFF2-40B4-BE49-F238E27FC236}">
-                <a16:creationId xmlns:a16="http://schemas.microsoft.com/office/drawing/2014/main" id="{C85144DF-D7CB-4EB3-AEE6-08A21B2322BF}"/>
+                <a16:creationId xmlns:a16="http://schemas.microsoft.com/office/drawing/2014/main" id="{E49EF5EB-D355-460C-B7BF-63CDABDDE97B}"/>
               </a:ext>
             </a:extLst>
           </p:cNvPr>
@@ -3447,7 +3785,7 @@
         </p:nvSpPr>
         <p:spPr>
           <a:xfrm>
-            <a:off x="3044603" y="2875"/>
+            <a:off x="2644553" y="-16175"/>
             <a:ext cx="1135548" cy="215444"/>
           </a:xfrm>
           <a:prstGeom prst="rect">
@@ -3463,7 +3801,7 @@
           <a:p>
             <a:r>
               <a:rPr lang="en-GB" sz="800" dirty="0"/>
-              <a:t>99</a:t>
+              <a:t>ecPoint 99</a:t>
             </a:r>
             <a:r>
               <a:rPr lang="en-GB" sz="800" baseline="30000" dirty="0"/>
@@ -3476,83 +3814,12 @@
           </a:p>
         </p:txBody>
       </p:sp>
-      <p:pic>
-        <p:nvPicPr>
-          <p:cNvPr id="49" name="Picture 48" descr="Chart, line chart&#10;&#10;Description automatically generated">
+      <p:sp>
+        <p:nvSpPr>
+          <p:cNvPr id="28" name="TextBox 27">
             <a:extLst>
               <a:ext uri="{FF2B5EF4-FFF2-40B4-BE49-F238E27FC236}">
-                <a16:creationId xmlns:a16="http://schemas.microsoft.com/office/drawing/2014/main" id="{3E66EDA0-93F4-4DC7-A233-B9107C113CC5}"/>
-              </a:ext>
-            </a:extLst>
-          </p:cNvPr>
-          <p:cNvPicPr>
-            <a:picLocks noChangeAspect="1"/>
-          </p:cNvPicPr>
-          <p:nvPr/>
-        </p:nvPicPr>
-        <p:blipFill>
-          <a:blip r:embed="rId4">
-            <a:extLst>
-              <a:ext uri="{28A0092B-C50C-407E-A947-70E740481C1C}">
-                <a14:useLocalDpi xmlns:a14="http://schemas.microsoft.com/office/drawing/2010/main" val="0"/>
-              </a:ext>
-            </a:extLst>
-          </a:blip>
-          <a:stretch>
-            <a:fillRect/>
-          </a:stretch>
-        </p:blipFill>
-        <p:spPr>
-          <a:xfrm>
-            <a:off x="220021" y="308791"/>
-            <a:ext cx="2880000" cy="2160246"/>
-          </a:xfrm>
-          <a:prstGeom prst="rect">
-            <a:avLst/>
-          </a:prstGeom>
-        </p:spPr>
-      </p:pic>
-      <p:pic>
-        <p:nvPicPr>
-          <p:cNvPr id="50" name="Picture 49" descr="Chart, line chart&#10;&#10;Description automatically generated">
-            <a:extLst>
-              <a:ext uri="{FF2B5EF4-FFF2-40B4-BE49-F238E27FC236}">
-                <a16:creationId xmlns:a16="http://schemas.microsoft.com/office/drawing/2014/main" id="{5543B88E-C763-4EF7-BDB6-933E0AF3C5A1}"/>
-              </a:ext>
-            </a:extLst>
-          </p:cNvPr>
-          <p:cNvPicPr>
-            <a:picLocks noChangeAspect="1"/>
-          </p:cNvPicPr>
-          <p:nvPr/>
-        </p:nvPicPr>
-        <p:blipFill rotWithShape="1">
-          <a:blip r:embed="rId5">
-            <a:extLst>
-              <a:ext uri="{28A0092B-C50C-407E-A947-70E740481C1C}">
-                <a14:useLocalDpi xmlns:a14="http://schemas.microsoft.com/office/drawing/2010/main" val="0"/>
-              </a:ext>
-            </a:extLst>
-          </a:blip>
-          <a:srcRect r="5771"/>
-          <a:stretch/>
-        </p:blipFill>
-        <p:spPr>
-          <a:xfrm>
-            <a:off x="2872409" y="308791"/>
-            <a:ext cx="2713792" cy="2160246"/>
-          </a:xfrm>
-          <a:prstGeom prst="rect">
-            <a:avLst/>
-          </a:prstGeom>
-        </p:spPr>
-      </p:pic>
-      <p:sp>
-        <p:nvSpPr>
-          <p:cNvPr id="51" name="TextBox 50">
-            <a:extLst>
-              <a:ext uri="{FF2B5EF4-FFF2-40B4-BE49-F238E27FC236}">
-                <a16:creationId xmlns:a16="http://schemas.microsoft.com/office/drawing/2014/main" id="{1B431A1E-9EB1-48ED-921B-82E25AAF2A9F}"/>
+                <a16:creationId xmlns:a16="http://schemas.microsoft.com/office/drawing/2014/main" id="{68727786-CEE6-42D3-ABE6-04D199F99144}"/>
               </a:ext>
             </a:extLst>
           </p:cNvPr>
@@ -3561,8 +3828,8 @@
         </p:nvSpPr>
         <p:spPr>
           <a:xfrm>
-            <a:off x="547949" y="201069"/>
-            <a:ext cx="2324460" cy="215444"/>
+            <a:off x="2854378" y="2344399"/>
+            <a:ext cx="2256955" cy="215444"/>
           </a:xfrm>
           <a:prstGeom prst="rect">
             <a:avLst/>
@@ -3577,257 +3844,8 @@
           <a:p>
             <a:pPr algn="ctr"/>
             <a:r>
-              <a:rPr lang="en-US" sz="800" b="1" dirty="0"/>
-              <a:t>“La Costa”</a:t>
-            </a:r>
-            <a:endParaRPr lang="en-GB" sz="800" b="1" dirty="0"/>
-          </a:p>
-        </p:txBody>
-      </p:sp>
-      <p:sp>
-        <p:nvSpPr>
-          <p:cNvPr id="52" name="TextBox 51">
-            <a:extLst>
-              <a:ext uri="{FF2B5EF4-FFF2-40B4-BE49-F238E27FC236}">
-                <a16:creationId xmlns:a16="http://schemas.microsoft.com/office/drawing/2014/main" id="{F7BAB39E-BF68-462E-8CB0-A716B5998EE9}"/>
-              </a:ext>
-            </a:extLst>
-          </p:cNvPr>
-          <p:cNvSpPr txBox="1"/>
-          <p:nvPr/>
-        </p:nvSpPr>
-        <p:spPr>
-          <a:xfrm>
-            <a:off x="3264567" y="201069"/>
-            <a:ext cx="2324460" cy="215444"/>
-          </a:xfrm>
-          <a:prstGeom prst="rect">
-            <a:avLst/>
-          </a:prstGeom>
-          <a:noFill/>
-        </p:spPr>
-        <p:txBody>
-          <a:bodyPr wrap="square" rtlCol="0">
-            <a:spAutoFit/>
-          </a:bodyPr>
-          <a:lstStyle/>
-          <a:p>
-            <a:pPr algn="ctr"/>
-            <a:r>
-              <a:rPr lang="en-US" sz="800" b="1" dirty="0"/>
-              <a:t>“La Sierra”</a:t>
-            </a:r>
-            <a:endParaRPr lang="en-GB" sz="800" b="1" dirty="0"/>
-          </a:p>
-        </p:txBody>
-      </p:sp>
-      <p:sp>
-        <p:nvSpPr>
-          <p:cNvPr id="53" name="TextBox 52">
-            <a:extLst>
-              <a:ext uri="{FF2B5EF4-FFF2-40B4-BE49-F238E27FC236}">
-                <a16:creationId xmlns:a16="http://schemas.microsoft.com/office/drawing/2014/main" id="{0EE0A456-623F-41C1-98ED-0D30E8C13965}"/>
-              </a:ext>
-            </a:extLst>
-          </p:cNvPr>
-          <p:cNvSpPr txBox="1"/>
-          <p:nvPr/>
-        </p:nvSpPr>
-        <p:spPr>
-          <a:xfrm>
-            <a:off x="121924" y="416513"/>
-            <a:ext cx="307777" cy="2046760"/>
-          </a:xfrm>
-          <a:prstGeom prst="rect">
-            <a:avLst/>
-          </a:prstGeom>
-          <a:noFill/>
-        </p:spPr>
-        <p:txBody>
-          <a:bodyPr vert="vert270" wrap="square" rtlCol="0">
-            <a:spAutoFit/>
-          </a:bodyPr>
-          <a:lstStyle/>
-          <a:p>
-            <a:pPr algn="ctr"/>
-            <a:r>
               <a:rPr lang="en-US" sz="800" dirty="0"/>
-              <a:t>Hit Rate</a:t>
-            </a:r>
-            <a:endParaRPr lang="en-GB" sz="800" dirty="0"/>
-          </a:p>
-        </p:txBody>
-      </p:sp>
-      <p:sp>
-        <p:nvSpPr>
-          <p:cNvPr id="18" name="TextBox 17">
-            <a:extLst>
-              <a:ext uri="{FF2B5EF4-FFF2-40B4-BE49-F238E27FC236}">
-                <a16:creationId xmlns:a16="http://schemas.microsoft.com/office/drawing/2014/main" id="{C87F8855-8D08-4759-BC64-EEC3033666E3}"/>
-              </a:ext>
-            </a:extLst>
-          </p:cNvPr>
-          <p:cNvSpPr txBox="1"/>
-          <p:nvPr/>
-        </p:nvSpPr>
-        <p:spPr>
-          <a:xfrm>
-            <a:off x="2538716" y="1937105"/>
-            <a:ext cx="215445" cy="215444"/>
-          </a:xfrm>
-          <a:prstGeom prst="rect">
-            <a:avLst/>
-          </a:prstGeom>
-          <a:solidFill>
-            <a:schemeClr val="bg1"/>
-          </a:solidFill>
-          <a:ln>
-            <a:solidFill>
-              <a:schemeClr val="tx1"/>
-            </a:solidFill>
-          </a:ln>
-        </p:spPr>
-        <p:txBody>
-          <a:bodyPr wrap="square" rtlCol="0">
-            <a:spAutoFit/>
-          </a:bodyPr>
-          <a:lstStyle/>
-          <a:p>
-            <a:pPr algn="ctr"/>
-            <a:r>
-              <a:rPr lang="en-GB" sz="800" dirty="0"/>
-              <a:t>a</a:t>
-            </a:r>
-          </a:p>
-        </p:txBody>
-      </p:sp>
-      <p:sp>
-        <p:nvSpPr>
-          <p:cNvPr id="19" name="TextBox 18">
-            <a:extLst>
-              <a:ext uri="{FF2B5EF4-FFF2-40B4-BE49-F238E27FC236}">
-                <a16:creationId xmlns:a16="http://schemas.microsoft.com/office/drawing/2014/main" id="{C2E805C3-1A8B-4566-B03F-9BA3E2482AC6}"/>
-              </a:ext>
-            </a:extLst>
-          </p:cNvPr>
-          <p:cNvSpPr txBox="1"/>
-          <p:nvPr/>
-        </p:nvSpPr>
-        <p:spPr>
-          <a:xfrm>
-            <a:off x="5209036" y="1937105"/>
-            <a:ext cx="215445" cy="215444"/>
-          </a:xfrm>
-          <a:prstGeom prst="rect">
-            <a:avLst/>
-          </a:prstGeom>
-          <a:solidFill>
-            <a:schemeClr val="bg1"/>
-          </a:solidFill>
-          <a:ln>
-            <a:solidFill>
-              <a:schemeClr val="tx1"/>
-            </a:solidFill>
-          </a:ln>
-        </p:spPr>
-        <p:txBody>
-          <a:bodyPr wrap="square" rtlCol="0">
-            <a:spAutoFit/>
-          </a:bodyPr>
-          <a:lstStyle/>
-          <a:p>
-            <a:pPr algn="ctr"/>
-            <a:r>
-              <a:rPr lang="en-US" sz="800" dirty="0"/>
-              <a:t>c</a:t>
-            </a:r>
-            <a:endParaRPr lang="en-GB" sz="800" dirty="0"/>
-          </a:p>
-        </p:txBody>
-      </p:sp>
-      <p:sp>
-        <p:nvSpPr>
-          <p:cNvPr id="20" name="TextBox 19">
-            <a:extLst>
-              <a:ext uri="{FF2B5EF4-FFF2-40B4-BE49-F238E27FC236}">
-                <a16:creationId xmlns:a16="http://schemas.microsoft.com/office/drawing/2014/main" id="{208AADB8-F03C-42A0-B9C2-AE16EB43C12C}"/>
-              </a:ext>
-            </a:extLst>
-          </p:cNvPr>
-          <p:cNvSpPr txBox="1"/>
-          <p:nvPr/>
-        </p:nvSpPr>
-        <p:spPr>
-          <a:xfrm>
-            <a:off x="2538716" y="3989629"/>
-            <a:ext cx="215445" cy="215444"/>
-          </a:xfrm>
-          <a:prstGeom prst="rect">
-            <a:avLst/>
-          </a:prstGeom>
-          <a:solidFill>
-            <a:schemeClr val="bg1"/>
-          </a:solidFill>
-          <a:ln>
-            <a:solidFill>
-              <a:schemeClr val="tx1"/>
-            </a:solidFill>
-          </a:ln>
-        </p:spPr>
-        <p:txBody>
-          <a:bodyPr wrap="square" rtlCol="0">
-            <a:spAutoFit/>
-          </a:bodyPr>
-          <a:lstStyle/>
-          <a:p>
-            <a:pPr algn="ctr"/>
-            <a:r>
-              <a:rPr lang="en-US" sz="800" dirty="0"/>
-              <a:t>b</a:t>
-            </a:r>
-            <a:endParaRPr lang="en-GB" sz="800" dirty="0"/>
-          </a:p>
-        </p:txBody>
-      </p:sp>
-      <p:sp>
-        <p:nvSpPr>
-          <p:cNvPr id="21" name="TextBox 20">
-            <a:extLst>
-              <a:ext uri="{FF2B5EF4-FFF2-40B4-BE49-F238E27FC236}">
-                <a16:creationId xmlns:a16="http://schemas.microsoft.com/office/drawing/2014/main" id="{8DA46921-BCAF-44C0-96EA-D94026E977B8}"/>
-              </a:ext>
-            </a:extLst>
-          </p:cNvPr>
-          <p:cNvSpPr txBox="1"/>
-          <p:nvPr/>
-        </p:nvSpPr>
-        <p:spPr>
-          <a:xfrm>
-            <a:off x="5209036" y="3989629"/>
-            <a:ext cx="215445" cy="215444"/>
-          </a:xfrm>
-          <a:prstGeom prst="rect">
-            <a:avLst/>
-          </a:prstGeom>
-          <a:solidFill>
-            <a:schemeClr val="bg1"/>
-          </a:solidFill>
-          <a:ln>
-            <a:solidFill>
-              <a:schemeClr val="tx1"/>
-            </a:solidFill>
-          </a:ln>
-        </p:spPr>
-        <p:txBody>
-          <a:bodyPr wrap="square" rtlCol="0">
-            <a:spAutoFit/>
-          </a:bodyPr>
-          <a:lstStyle/>
-          <a:p>
-            <a:pPr algn="ctr"/>
-            <a:r>
-              <a:rPr lang="en-US" sz="800" dirty="0"/>
-              <a:t>d</a:t>
+              <a:t>False Alarm Rate</a:t>
             </a:r>
             <a:endParaRPr lang="en-GB" sz="800" dirty="0"/>
           </a:p>
@@ -3836,7 +3854,7 @@
     </p:spTree>
     <p:extLst>
       <p:ext uri="{BB962C8B-B14F-4D97-AF65-F5344CB8AC3E}">
-        <p14:creationId xmlns:p14="http://schemas.microsoft.com/office/powerpoint/2010/main" val="4041778352"/>
+        <p14:creationId xmlns:p14="http://schemas.microsoft.com/office/powerpoint/2010/main" val="731191140"/>
       </p:ext>
     </p:extLst>
   </p:cSld>

</xml_diff>